<commit_message>
Updated LEADS.pptx. (#316) (#340)
</commit_message>
<xml_diff>
--- a/docs/LEADS.pptx
+++ b/docs/LEADS.pptx
@@ -124,7 +124,7 @@
 <file path=ppt/revisionInfo.xml><?xml version="1.0" encoding="utf-8"?>
 <p1510:revInfo xmlns:a="http://schemas.openxmlformats.org/drawingml/2006/main" xmlns:r="http://schemas.openxmlformats.org/officeDocument/2006/relationships" xmlns:p1510="http://schemas.microsoft.com/office/powerpoint/2015/10/main">
   <p1510:revLst>
-    <p1510:client id="{2628F682-DF01-404E-B59F-6BDA13BCEEDE}" v="331" dt="2024-07-26T15:26:56.481"/>
+    <p1510:client id="{2628F682-DF01-404E-B59F-6BDA13BCEEDE}" v="442" dt="2024-08-04T07:19:31.138"/>
   </p1510:revLst>
 </p1510:revInfo>
 </file>
@@ -134,7 +134,7 @@
   <pc:docChgLst>
     <pc:chgData name="Tianhao Fu" userId="3c5ffcaadea6c056" providerId="LiveId" clId="{2628F682-DF01-404E-B59F-6BDA13BCEEDE}"/>
     <pc:docChg chg="undo custSel addSld delSld modSld sldOrd modMainMaster">
-      <pc:chgData name="Tianhao Fu" userId="3c5ffcaadea6c056" providerId="LiveId" clId="{2628F682-DF01-404E-B59F-6BDA13BCEEDE}" dt="2024-07-26T15:45:30.942" v="5542" actId="2696"/>
+      <pc:chgData name="Tianhao Fu" userId="3c5ffcaadea6c056" providerId="LiveId" clId="{2628F682-DF01-404E-B59F-6BDA13BCEEDE}" dt="2024-08-04T07:19:41.995" v="5706" actId="478"/>
       <pc:docMkLst>
         <pc:docMk/>
       </pc:docMkLst>
@@ -335,8 +335,8 @@
           </ac:spMkLst>
         </pc:spChg>
       </pc:sldChg>
-      <pc:sldChg chg="addSp delSp modSp new mod ord setBg modAnim">
-        <pc:chgData name="Tianhao Fu" userId="3c5ffcaadea6c056" providerId="LiveId" clId="{2628F682-DF01-404E-B59F-6BDA13BCEEDE}" dt="2024-07-26T12:14:40.563" v="5135"/>
+      <pc:sldChg chg="addSp delSp modSp new mod ord setBg delAnim modAnim">
+        <pc:chgData name="Tianhao Fu" userId="3c5ffcaadea6c056" providerId="LiveId" clId="{2628F682-DF01-404E-B59F-6BDA13BCEEDE}" dt="2024-08-04T07:19:41.995" v="5706" actId="478"/>
         <pc:sldMkLst>
           <pc:docMk/>
           <pc:sldMk cId="1881318779" sldId="259"/>
@@ -430,7 +430,7 @@
           </ac:spMkLst>
         </pc:spChg>
         <pc:spChg chg="add mod">
-          <ac:chgData name="Tianhao Fu" userId="3c5ffcaadea6c056" providerId="LiveId" clId="{2628F682-DF01-404E-B59F-6BDA13BCEEDE}" dt="2024-07-25T04:52:19.708" v="3500" actId="207"/>
+          <ac:chgData name="Tianhao Fu" userId="3c5ffcaadea6c056" providerId="LiveId" clId="{2628F682-DF01-404E-B59F-6BDA13BCEEDE}" dt="2024-08-04T07:14:24.446" v="5596" actId="12788"/>
           <ac:spMkLst>
             <pc:docMk/>
             <pc:sldMk cId="1881318779" sldId="259"/>
@@ -438,7 +438,7 @@
           </ac:spMkLst>
         </pc:spChg>
         <pc:spChg chg="add mod">
-          <ac:chgData name="Tianhao Fu" userId="3c5ffcaadea6c056" providerId="LiveId" clId="{2628F682-DF01-404E-B59F-6BDA13BCEEDE}" dt="2024-07-25T04:52:19.708" v="3500" actId="207"/>
+          <ac:chgData name="Tianhao Fu" userId="3c5ffcaadea6c056" providerId="LiveId" clId="{2628F682-DF01-404E-B59F-6BDA13BCEEDE}" dt="2024-08-04T07:14:24.446" v="5596" actId="12788"/>
           <ac:spMkLst>
             <pc:docMk/>
             <pc:sldMk cId="1881318779" sldId="259"/>
@@ -446,7 +446,7 @@
           </ac:spMkLst>
         </pc:spChg>
         <pc:spChg chg="add mod">
-          <ac:chgData name="Tianhao Fu" userId="3c5ffcaadea6c056" providerId="LiveId" clId="{2628F682-DF01-404E-B59F-6BDA13BCEEDE}" dt="2024-07-25T04:52:19.708" v="3500" actId="207"/>
+          <ac:chgData name="Tianhao Fu" userId="3c5ffcaadea6c056" providerId="LiveId" clId="{2628F682-DF01-404E-B59F-6BDA13BCEEDE}" dt="2024-08-04T07:14:24.446" v="5596" actId="12788"/>
           <ac:spMkLst>
             <pc:docMk/>
             <pc:sldMk cId="1881318779" sldId="259"/>
@@ -462,7 +462,15 @@
           </ac:spMkLst>
         </pc:spChg>
         <pc:spChg chg="add mod">
-          <ac:chgData name="Tianhao Fu" userId="3c5ffcaadea6c056" providerId="LiveId" clId="{2628F682-DF01-404E-B59F-6BDA13BCEEDE}" dt="2024-07-25T05:09:03.662" v="3975" actId="208"/>
+          <ac:chgData name="Tianhao Fu" userId="3c5ffcaadea6c056" providerId="LiveId" clId="{2628F682-DF01-404E-B59F-6BDA13BCEEDE}" dt="2024-08-04T07:19:26.989" v="5702" actId="1076"/>
+          <ac:spMkLst>
+            <pc:docMk/>
+            <pc:sldMk cId="1881318779" sldId="259"/>
+            <ac:spMk id="18" creationId="{633A54D1-42DC-6B31-8CAC-F8596E46BA4F}"/>
+          </ac:spMkLst>
+        </pc:spChg>
+        <pc:spChg chg="add mod">
+          <ac:chgData name="Tianhao Fu" userId="3c5ffcaadea6c056" providerId="LiveId" clId="{2628F682-DF01-404E-B59F-6BDA13BCEEDE}" dt="2024-08-04T07:14:24.446" v="5596" actId="12788"/>
           <ac:spMkLst>
             <pc:docMk/>
             <pc:sldMk cId="1881318779" sldId="259"/>
@@ -470,7 +478,7 @@
           </ac:spMkLst>
         </pc:spChg>
         <pc:spChg chg="add mod">
-          <ac:chgData name="Tianhao Fu" userId="3c5ffcaadea6c056" providerId="LiveId" clId="{2628F682-DF01-404E-B59F-6BDA13BCEEDE}" dt="2024-07-25T04:52:19.708" v="3500" actId="207"/>
+          <ac:chgData name="Tianhao Fu" userId="3c5ffcaadea6c056" providerId="LiveId" clId="{2628F682-DF01-404E-B59F-6BDA13BCEEDE}" dt="2024-08-04T07:14:24.446" v="5596" actId="12788"/>
           <ac:spMkLst>
             <pc:docMk/>
             <pc:sldMk cId="1881318779" sldId="259"/>
@@ -486,6 +494,14 @@
           </ac:spMkLst>
         </pc:spChg>
         <pc:spChg chg="add del mod">
+          <ac:chgData name="Tianhao Fu" userId="3c5ffcaadea6c056" providerId="LiveId" clId="{2628F682-DF01-404E-B59F-6BDA13BCEEDE}" dt="2024-08-04T07:11:58.911" v="5565" actId="478"/>
+          <ac:spMkLst>
+            <pc:docMk/>
+            <pc:sldMk cId="1881318779" sldId="259"/>
+            <ac:spMk id="31" creationId="{629F633C-8070-0429-E64A-D04CCAF05489}"/>
+          </ac:spMkLst>
+        </pc:spChg>
+        <pc:spChg chg="add del mod">
           <ac:chgData name="Tianhao Fu" userId="3c5ffcaadea6c056" providerId="LiveId" clId="{2628F682-DF01-404E-B59F-6BDA13BCEEDE}" dt="2024-07-24T04:47:37.893" v="381" actId="478"/>
           <ac:spMkLst>
             <pc:docMk/>
@@ -502,7 +518,7 @@
           </ac:spMkLst>
         </pc:spChg>
         <pc:spChg chg="add mod">
-          <ac:chgData name="Tianhao Fu" userId="3c5ffcaadea6c056" providerId="LiveId" clId="{2628F682-DF01-404E-B59F-6BDA13BCEEDE}" dt="2024-07-25T04:52:14.166" v="3499" actId="207"/>
+          <ac:chgData name="Tianhao Fu" userId="3c5ffcaadea6c056" providerId="LiveId" clId="{2628F682-DF01-404E-B59F-6BDA13BCEEDE}" dt="2024-08-04T07:14:54.540" v="5602" actId="12789"/>
           <ac:spMkLst>
             <pc:docMk/>
             <pc:sldMk cId="1881318779" sldId="259"/>
@@ -510,7 +526,7 @@
           </ac:spMkLst>
         </pc:spChg>
         <pc:spChg chg="add mod">
-          <ac:chgData name="Tianhao Fu" userId="3c5ffcaadea6c056" providerId="LiveId" clId="{2628F682-DF01-404E-B59F-6BDA13BCEEDE}" dt="2024-07-25T04:52:19.708" v="3500" actId="207"/>
+          <ac:chgData name="Tianhao Fu" userId="3c5ffcaadea6c056" providerId="LiveId" clId="{2628F682-DF01-404E-B59F-6BDA13BCEEDE}" dt="2024-08-04T07:14:54.540" v="5602" actId="12789"/>
           <ac:spMkLst>
             <pc:docMk/>
             <pc:sldMk cId="1881318779" sldId="259"/>
@@ -518,7 +534,7 @@
           </ac:spMkLst>
         </pc:spChg>
         <pc:spChg chg="add mod">
-          <ac:chgData name="Tianhao Fu" userId="3c5ffcaadea6c056" providerId="LiveId" clId="{2628F682-DF01-404E-B59F-6BDA13BCEEDE}" dt="2024-07-25T05:08:39.923" v="3967" actId="208"/>
+          <ac:chgData name="Tianhao Fu" userId="3c5ffcaadea6c056" providerId="LiveId" clId="{2628F682-DF01-404E-B59F-6BDA13BCEEDE}" dt="2024-08-04T07:19:41.010" v="5705" actId="14100"/>
           <ac:spMkLst>
             <pc:docMk/>
             <pc:sldMk cId="1881318779" sldId="259"/>
@@ -526,6 +542,14 @@
           </ac:spMkLst>
         </pc:spChg>
         <pc:spChg chg="add del mod">
+          <ac:chgData name="Tianhao Fu" userId="3c5ffcaadea6c056" providerId="LiveId" clId="{2628F682-DF01-404E-B59F-6BDA13BCEEDE}" dt="2024-08-04T07:12:15.649" v="5569" actId="478"/>
+          <ac:spMkLst>
+            <pc:docMk/>
+            <pc:sldMk cId="1881318779" sldId="259"/>
+            <ac:spMk id="49" creationId="{28CAB8AC-8232-A8EB-0126-2D7203FB76E2}"/>
+          </ac:spMkLst>
+        </pc:spChg>
+        <pc:spChg chg="add del mod">
           <ac:chgData name="Tianhao Fu" userId="3c5ffcaadea6c056" providerId="LiveId" clId="{2628F682-DF01-404E-B59F-6BDA13BCEEDE}" dt="2024-07-24T09:07:36.532" v="2255" actId="478"/>
           <ac:spMkLst>
             <pc:docMk/>
@@ -534,11 +558,19 @@
           </ac:spMkLst>
         </pc:spChg>
         <pc:spChg chg="add mod">
-          <ac:chgData name="Tianhao Fu" userId="3c5ffcaadea6c056" providerId="LiveId" clId="{2628F682-DF01-404E-B59F-6BDA13BCEEDE}" dt="2024-07-25T04:52:09.958" v="3498" actId="207"/>
+          <ac:chgData name="Tianhao Fu" userId="3c5ffcaadea6c056" providerId="LiveId" clId="{2628F682-DF01-404E-B59F-6BDA13BCEEDE}" dt="2024-08-04T07:14:24.446" v="5596" actId="12788"/>
           <ac:spMkLst>
             <pc:docMk/>
             <pc:sldMk cId="1881318779" sldId="259"/>
             <ac:spMk id="57" creationId="{8852AD21-42C3-6AD8-C6F1-C6DBEF6E96F2}"/>
+          </ac:spMkLst>
+        </pc:spChg>
+        <pc:spChg chg="add del mod">
+          <ac:chgData name="Tianhao Fu" userId="3c5ffcaadea6c056" providerId="LiveId" clId="{2628F682-DF01-404E-B59F-6BDA13BCEEDE}" dt="2024-08-04T07:19:41.995" v="5706" actId="478"/>
+          <ac:spMkLst>
+            <pc:docMk/>
+            <pc:sldMk cId="1881318779" sldId="259"/>
+            <ac:spMk id="61" creationId="{4F3AD185-B40A-7B57-8CC1-33D6CB8DE190}"/>
           </ac:spMkLst>
         </pc:spChg>
         <pc:cxnChg chg="add del mod">
@@ -550,7 +582,7 @@
           </ac:cxnSpMkLst>
         </pc:cxnChg>
         <pc:cxnChg chg="add mod">
-          <ac:chgData name="Tianhao Fu" userId="3c5ffcaadea6c056" providerId="LiveId" clId="{2628F682-DF01-404E-B59F-6BDA13BCEEDE}" dt="2024-07-25T05:08:59.134" v="3973" actId="208"/>
+          <ac:chgData name="Tianhao Fu" userId="3c5ffcaadea6c056" providerId="LiveId" clId="{2628F682-DF01-404E-B59F-6BDA13BCEEDE}" dt="2024-08-04T07:14:24.446" v="5596" actId="12788"/>
           <ac:cxnSpMkLst>
             <pc:docMk/>
             <pc:sldMk cId="1881318779" sldId="259"/>
@@ -558,7 +590,7 @@
           </ac:cxnSpMkLst>
         </pc:cxnChg>
         <pc:cxnChg chg="add mod">
-          <ac:chgData name="Tianhao Fu" userId="3c5ffcaadea6c056" providerId="LiveId" clId="{2628F682-DF01-404E-B59F-6BDA13BCEEDE}" dt="2024-07-25T05:09:01.458" v="3974" actId="208"/>
+          <ac:chgData name="Tianhao Fu" userId="3c5ffcaadea6c056" providerId="LiveId" clId="{2628F682-DF01-404E-B59F-6BDA13BCEEDE}" dt="2024-08-04T07:14:24.446" v="5596" actId="12788"/>
           <ac:cxnSpMkLst>
             <pc:docMk/>
             <pc:sldMk cId="1881318779" sldId="259"/>
@@ -566,7 +598,7 @@
           </ac:cxnSpMkLst>
         </pc:cxnChg>
         <pc:cxnChg chg="add del mod">
-          <ac:chgData name="Tianhao Fu" userId="3c5ffcaadea6c056" providerId="LiveId" clId="{2628F682-DF01-404E-B59F-6BDA13BCEEDE}" dt="2024-07-25T05:08:51.078" v="3970" actId="208"/>
+          <ac:chgData name="Tianhao Fu" userId="3c5ffcaadea6c056" providerId="LiveId" clId="{2628F682-DF01-404E-B59F-6BDA13BCEEDE}" dt="2024-08-04T07:19:41.010" v="5705" actId="14100"/>
           <ac:cxnSpMkLst>
             <pc:docMk/>
             <pc:sldMk cId="1881318779" sldId="259"/>
@@ -574,7 +606,7 @@
           </ac:cxnSpMkLst>
         </pc:cxnChg>
         <pc:cxnChg chg="add mod">
-          <ac:chgData name="Tianhao Fu" userId="3c5ffcaadea6c056" providerId="LiveId" clId="{2628F682-DF01-404E-B59F-6BDA13BCEEDE}" dt="2024-07-25T05:08:53.577" v="3971" actId="208"/>
+          <ac:chgData name="Tianhao Fu" userId="3c5ffcaadea6c056" providerId="LiveId" clId="{2628F682-DF01-404E-B59F-6BDA13BCEEDE}" dt="2024-08-04T07:19:41.010" v="5705" actId="14100"/>
           <ac:cxnSpMkLst>
             <pc:docMk/>
             <pc:sldMk cId="1881318779" sldId="259"/>
@@ -582,23 +614,39 @@
           </ac:cxnSpMkLst>
         </pc:cxnChg>
         <pc:cxnChg chg="add del mod">
-          <ac:chgData name="Tianhao Fu" userId="3c5ffcaadea6c056" providerId="LiveId" clId="{2628F682-DF01-404E-B59F-6BDA13BCEEDE}" dt="2024-07-25T05:08:55.981" v="3972" actId="208"/>
+          <ac:chgData name="Tianhao Fu" userId="3c5ffcaadea6c056" providerId="LiveId" clId="{2628F682-DF01-404E-B59F-6BDA13BCEEDE}" dt="2024-08-04T07:19:41.010" v="5705" actId="14100"/>
           <ac:cxnSpMkLst>
             <pc:docMk/>
             <pc:sldMk cId="1881318779" sldId="259"/>
             <ac:cxnSpMk id="51" creationId="{E167C354-8A79-6202-60C4-09454A54173B}"/>
           </ac:cxnSpMkLst>
         </pc:cxnChg>
+        <pc:cxnChg chg="add del mod">
+          <ac:chgData name="Tianhao Fu" userId="3c5ffcaadea6c056" providerId="LiveId" clId="{2628F682-DF01-404E-B59F-6BDA13BCEEDE}" dt="2024-08-04T07:13:16.935" v="5578" actId="478"/>
+          <ac:cxnSpMkLst>
+            <pc:docMk/>
+            <pc:sldMk cId="1881318779" sldId="259"/>
+            <ac:cxnSpMk id="56" creationId="{8E50110F-7AD6-8615-D123-26ADAFDCBBA0}"/>
+          </ac:cxnSpMkLst>
+        </pc:cxnChg>
         <pc:cxnChg chg="add mod">
-          <ac:chgData name="Tianhao Fu" userId="3c5ffcaadea6c056" providerId="LiveId" clId="{2628F682-DF01-404E-B59F-6BDA13BCEEDE}" dt="2024-07-25T05:08:47.740" v="3969" actId="208"/>
+          <ac:chgData name="Tianhao Fu" userId="3c5ffcaadea6c056" providerId="LiveId" clId="{2628F682-DF01-404E-B59F-6BDA13BCEEDE}" dt="2024-08-04T07:14:24.446" v="5596" actId="12788"/>
           <ac:cxnSpMkLst>
             <pc:docMk/>
             <pc:sldMk cId="1881318779" sldId="259"/>
             <ac:cxnSpMk id="58" creationId="{910A9505-960F-476E-1BD9-6676355CD59E}"/>
           </ac:cxnSpMkLst>
         </pc:cxnChg>
+        <pc:cxnChg chg="add del mod">
+          <ac:chgData name="Tianhao Fu" userId="3c5ffcaadea6c056" providerId="LiveId" clId="{2628F682-DF01-404E-B59F-6BDA13BCEEDE}" dt="2024-08-04T07:14:17.398" v="5594" actId="478"/>
+          <ac:cxnSpMkLst>
+            <pc:docMk/>
+            <pc:sldMk cId="1881318779" sldId="259"/>
+            <ac:cxnSpMk id="60" creationId="{FC728E53-813C-11CD-C950-453F3CE003FE}"/>
+          </ac:cxnSpMkLst>
+        </pc:cxnChg>
         <pc:cxnChg chg="add mod">
-          <ac:chgData name="Tianhao Fu" userId="3c5ffcaadea6c056" providerId="LiveId" clId="{2628F682-DF01-404E-B59F-6BDA13BCEEDE}" dt="2024-07-25T05:08:45.297" v="3968" actId="208"/>
+          <ac:chgData name="Tianhao Fu" userId="3c5ffcaadea6c056" providerId="LiveId" clId="{2628F682-DF01-404E-B59F-6BDA13BCEEDE}" dt="2024-08-04T07:19:41.010" v="5705" actId="14100"/>
           <ac:cxnSpMkLst>
             <pc:docMk/>
             <pc:sldMk cId="1881318779" sldId="259"/>
@@ -1204,7 +1252,7 @@
         </pc:cxnChg>
       </pc:sldChg>
       <pc:sldChg chg="addSp delSp modSp add mod setBg modAnim">
-        <pc:chgData name="Tianhao Fu" userId="3c5ffcaadea6c056" providerId="LiveId" clId="{2628F682-DF01-404E-B59F-6BDA13BCEEDE}" dt="2024-07-26T15:22:43.991" v="5529" actId="14100"/>
+        <pc:chgData name="Tianhao Fu" userId="3c5ffcaadea6c056" providerId="LiveId" clId="{2628F682-DF01-404E-B59F-6BDA13BCEEDE}" dt="2024-07-26T16:10:03.466" v="5544" actId="2085"/>
         <pc:sldMkLst>
           <pc:docMk/>
           <pc:sldMk cId="3766991575" sldId="264"/>
@@ -1506,7 +1554,7 @@
           </ac:spMkLst>
         </pc:spChg>
         <pc:spChg chg="add mod">
-          <ac:chgData name="Tianhao Fu" userId="3c5ffcaadea6c056" providerId="LiveId" clId="{2628F682-DF01-404E-B59F-6BDA13BCEEDE}" dt="2024-07-26T14:59:37.327" v="5426" actId="1076"/>
+          <ac:chgData name="Tianhao Fu" userId="3c5ffcaadea6c056" providerId="LiveId" clId="{2628F682-DF01-404E-B59F-6BDA13BCEEDE}" dt="2024-07-26T16:10:03.466" v="5544" actId="2085"/>
           <ac:spMkLst>
             <pc:docMk/>
             <pc:sldMk cId="3766991575" sldId="264"/>
@@ -1860,7 +1908,7 @@
           <a:p>
             <a:fld id="{0FC8290A-0E42-2F47-A033-0833A59CB4B8}" type="datetimeFigureOut">
               <a:rPr lang="en-US" smtClean="0"/>
-              <a:t>7/26/24</a:t>
+              <a:t>8/4/24</a:t>
             </a:fld>
             <a:endParaRPr lang="en-US"/>
           </a:p>
@@ -2295,6 +2343,90 @@
 </p:notes>
 </file>
 
+<file path=ppt/notesSlides/notesSlide3.xml><?xml version="1.0" encoding="utf-8"?>
+<p:notes xmlns:a="http://schemas.openxmlformats.org/drawingml/2006/main" xmlns:r="http://schemas.openxmlformats.org/officeDocument/2006/relationships" xmlns:p="http://schemas.openxmlformats.org/presentationml/2006/main">
+  <p:cSld>
+    <p:spTree>
+      <p:nvGrpSpPr>
+        <p:cNvPr id="1" name=""/>
+        <p:cNvGrpSpPr/>
+        <p:nvPr/>
+      </p:nvGrpSpPr>
+      <p:grpSpPr>
+        <a:xfrm>
+          <a:off x="0" y="0"/>
+          <a:ext cx="0" cy="0"/>
+          <a:chOff x="0" y="0"/>
+          <a:chExt cx="0" cy="0"/>
+        </a:xfrm>
+      </p:grpSpPr>
+      <p:sp>
+        <p:nvSpPr>
+          <p:cNvPr id="2" name="Slide Image Placeholder 1"/>
+          <p:cNvSpPr>
+            <a:spLocks noGrp="1" noRot="1" noChangeAspect="1"/>
+          </p:cNvSpPr>
+          <p:nvPr>
+            <p:ph type="sldImg"/>
+          </p:nvPr>
+        </p:nvSpPr>
+        <p:spPr/>
+      </p:sp>
+      <p:sp>
+        <p:nvSpPr>
+          <p:cNvPr id="3" name="Notes Placeholder 2"/>
+          <p:cNvSpPr>
+            <a:spLocks noGrp="1"/>
+          </p:cNvSpPr>
+          <p:nvPr>
+            <p:ph type="body" idx="1"/>
+          </p:nvPr>
+        </p:nvSpPr>
+        <p:spPr/>
+        <p:txBody>
+          <a:bodyPr/>
+          <a:lstStyle/>
+          <a:p>
+            <a:endParaRPr lang="en-US" dirty="0"/>
+          </a:p>
+        </p:txBody>
+      </p:sp>
+      <p:sp>
+        <p:nvSpPr>
+          <p:cNvPr id="4" name="Slide Number Placeholder 3"/>
+          <p:cNvSpPr>
+            <a:spLocks noGrp="1"/>
+          </p:cNvSpPr>
+          <p:nvPr>
+            <p:ph type="sldNum" sz="quarter" idx="5"/>
+          </p:nvPr>
+        </p:nvSpPr>
+        <p:spPr/>
+        <p:txBody>
+          <a:bodyPr/>
+          <a:lstStyle/>
+          <a:p>
+            <a:fld id="{7A965B42-9ED9-2B41-87DB-75DA12D8B177}" type="slidenum">
+              <a:rPr lang="en-US" smtClean="0"/>
+              <a:t>3</a:t>
+            </a:fld>
+            <a:endParaRPr lang="en-US"/>
+          </a:p>
+        </p:txBody>
+      </p:sp>
+    </p:spTree>
+    <p:extLst>
+      <p:ext uri="{BB962C8B-B14F-4D97-AF65-F5344CB8AC3E}">
+        <p14:creationId xmlns:p14="http://schemas.microsoft.com/office/powerpoint/2010/main" val="470147392"/>
+      </p:ext>
+    </p:extLst>
+  </p:cSld>
+  <p:clrMapOvr>
+    <a:masterClrMapping/>
+  </p:clrMapOvr>
+</p:notes>
+</file>
+
 <file path=ppt/slideLayouts/slideLayout1.xml><?xml version="1.0" encoding="utf-8"?>
 <p:sldLayout xmlns:a="http://schemas.openxmlformats.org/drawingml/2006/main" xmlns:r="http://schemas.openxmlformats.org/officeDocument/2006/relationships" xmlns:p="http://schemas.openxmlformats.org/presentationml/2006/main" type="title" preserve="1">
   <p:cSld name="Title Slide">
@@ -2426,7 +2558,7 @@
           <a:p>
             <a:fld id="{EB14851A-53D1-B04B-AD6B-CB7FEFB4C1FD}" type="datetimeFigureOut">
               <a:rPr lang="en-US" smtClean="0"/>
-              <a:t>7/26/24</a:t>
+              <a:t>8/4/24</a:t>
             </a:fld>
             <a:endParaRPr lang="en-US"/>
           </a:p>
@@ -2596,7 +2728,7 @@
           <a:p>
             <a:fld id="{EB14851A-53D1-B04B-AD6B-CB7FEFB4C1FD}" type="datetimeFigureOut">
               <a:rPr lang="en-US" smtClean="0"/>
-              <a:t>7/26/24</a:t>
+              <a:t>8/4/24</a:t>
             </a:fld>
             <a:endParaRPr lang="en-US"/>
           </a:p>
@@ -2776,7 +2908,7 @@
           <a:p>
             <a:fld id="{EB14851A-53D1-B04B-AD6B-CB7FEFB4C1FD}" type="datetimeFigureOut">
               <a:rPr lang="en-US" smtClean="0"/>
-              <a:t>7/26/24</a:t>
+              <a:t>8/4/24</a:t>
             </a:fld>
             <a:endParaRPr lang="en-US"/>
           </a:p>
@@ -2946,7 +3078,7 @@
           <a:p>
             <a:fld id="{EB14851A-53D1-B04B-AD6B-CB7FEFB4C1FD}" type="datetimeFigureOut">
               <a:rPr lang="en-US" smtClean="0"/>
-              <a:t>7/26/24</a:t>
+              <a:t>8/4/24</a:t>
             </a:fld>
             <a:endParaRPr lang="en-US"/>
           </a:p>
@@ -3192,7 +3324,7 @@
           <a:p>
             <a:fld id="{EB14851A-53D1-B04B-AD6B-CB7FEFB4C1FD}" type="datetimeFigureOut">
               <a:rPr lang="en-US" smtClean="0"/>
-              <a:t>7/26/24</a:t>
+              <a:t>8/4/24</a:t>
             </a:fld>
             <a:endParaRPr lang="en-US"/>
           </a:p>
@@ -3424,7 +3556,7 @@
           <a:p>
             <a:fld id="{EB14851A-53D1-B04B-AD6B-CB7FEFB4C1FD}" type="datetimeFigureOut">
               <a:rPr lang="en-US" smtClean="0"/>
-              <a:t>7/26/24</a:t>
+              <a:t>8/4/24</a:t>
             </a:fld>
             <a:endParaRPr lang="en-US"/>
           </a:p>
@@ -3791,7 +3923,7 @@
           <a:p>
             <a:fld id="{EB14851A-53D1-B04B-AD6B-CB7FEFB4C1FD}" type="datetimeFigureOut">
               <a:rPr lang="en-US" smtClean="0"/>
-              <a:t>7/26/24</a:t>
+              <a:t>8/4/24</a:t>
             </a:fld>
             <a:endParaRPr lang="en-US"/>
           </a:p>
@@ -3909,7 +4041,7 @@
           <a:p>
             <a:fld id="{EB14851A-53D1-B04B-AD6B-CB7FEFB4C1FD}" type="datetimeFigureOut">
               <a:rPr lang="en-US" smtClean="0"/>
-              <a:t>7/26/24</a:t>
+              <a:t>8/4/24</a:t>
             </a:fld>
             <a:endParaRPr lang="en-US"/>
           </a:p>
@@ -4004,7 +4136,7 @@
           <a:p>
             <a:fld id="{EB14851A-53D1-B04B-AD6B-CB7FEFB4C1FD}" type="datetimeFigureOut">
               <a:rPr lang="en-US" smtClean="0"/>
-              <a:t>7/26/24</a:t>
+              <a:t>8/4/24</a:t>
             </a:fld>
             <a:endParaRPr lang="en-US"/>
           </a:p>
@@ -4281,7 +4413,7 @@
           <a:p>
             <a:fld id="{EB14851A-53D1-B04B-AD6B-CB7FEFB4C1FD}" type="datetimeFigureOut">
               <a:rPr lang="en-US" smtClean="0"/>
-              <a:t>7/26/24</a:t>
+              <a:t>8/4/24</a:t>
             </a:fld>
             <a:endParaRPr lang="en-US"/>
           </a:p>
@@ -4538,7 +4670,7 @@
           <a:p>
             <a:fld id="{EB14851A-53D1-B04B-AD6B-CB7FEFB4C1FD}" type="datetimeFigureOut">
               <a:rPr lang="en-US" smtClean="0"/>
-              <a:t>7/26/24</a:t>
+              <a:t>8/4/24</a:t>
             </a:fld>
             <a:endParaRPr lang="en-US"/>
           </a:p>
@@ -4751,7 +4883,7 @@
           <a:p>
             <a:fld id="{EB14851A-53D1-B04B-AD6B-CB7FEFB4C1FD}" type="datetimeFigureOut">
               <a:rPr lang="en-US" smtClean="0"/>
-              <a:t>7/26/24</a:t>
+              <a:t>8/4/24</a:t>
             </a:fld>
             <a:endParaRPr lang="en-US"/>
           </a:p>
@@ -5941,7 +6073,7 @@
         </p:nvSpPr>
         <p:spPr>
           <a:xfrm>
-            <a:off x="4997706" y="5162553"/>
+            <a:off x="4470934" y="5101281"/>
             <a:ext cx="1478692" cy="877330"/>
           </a:xfrm>
           <a:prstGeom prst="roundRect">
@@ -6000,7 +6132,7 @@
         </p:nvSpPr>
         <p:spPr>
           <a:xfrm>
-            <a:off x="4715554" y="3554582"/>
+            <a:off x="4188782" y="3493310"/>
             <a:ext cx="1760840" cy="877330"/>
           </a:xfrm>
           <a:prstGeom prst="roundRect">
@@ -6059,7 +6191,7 @@
         </p:nvSpPr>
         <p:spPr>
           <a:xfrm>
-            <a:off x="6777081" y="3554582"/>
+            <a:off x="6250309" y="3493310"/>
             <a:ext cx="1734062" cy="877330"/>
           </a:xfrm>
           <a:prstGeom prst="roundRect">
@@ -6118,7 +6250,7 @@
         </p:nvSpPr>
         <p:spPr>
           <a:xfrm>
-            <a:off x="4742333" y="4967902"/>
+            <a:off x="4215561" y="4906630"/>
             <a:ext cx="3768811" cy="1266632"/>
           </a:xfrm>
           <a:prstGeom prst="roundRect">
@@ -6170,7 +6302,7 @@
         </p:nvSpPr>
         <p:spPr>
           <a:xfrm>
-            <a:off x="6777081" y="5162553"/>
+            <a:off x="6250309" y="5101281"/>
             <a:ext cx="1478692" cy="877330"/>
           </a:xfrm>
           <a:prstGeom prst="roundRect">
@@ -6233,7 +6365,7 @@
         </p:nvCxnSpPr>
         <p:spPr>
           <a:xfrm flipH="1" flipV="1">
-            <a:off x="5595974" y="4431912"/>
+            <a:off x="5069202" y="4370640"/>
             <a:ext cx="1030765" cy="535990"/>
           </a:xfrm>
           <a:prstGeom prst="straightConnector1">
@@ -6279,7 +6411,7 @@
         </p:nvCxnSpPr>
         <p:spPr>
           <a:xfrm flipV="1">
-            <a:off x="6626739" y="4431912"/>
+            <a:off x="6099967" y="4370640"/>
             <a:ext cx="1017373" cy="535990"/>
           </a:xfrm>
           <a:prstGeom prst="straightConnector1">
@@ -6321,7 +6453,7 @@
         </p:nvSpPr>
         <p:spPr>
           <a:xfrm>
-            <a:off x="4997706" y="1946611"/>
+            <a:off x="4470934" y="1885339"/>
             <a:ext cx="1478692" cy="877330"/>
           </a:xfrm>
           <a:prstGeom prst="roundRect">
@@ -6393,7 +6525,7 @@
         </p:nvSpPr>
         <p:spPr>
           <a:xfrm>
-            <a:off x="6777081" y="1946611"/>
+            <a:off x="6250309" y="1885339"/>
             <a:ext cx="1478692" cy="877330"/>
           </a:xfrm>
           <a:prstGeom prst="roundRect">
@@ -6468,8 +6600,8 @@
         </p:nvSpPr>
         <p:spPr>
           <a:xfrm>
-            <a:off x="4742332" y="1751960"/>
-            <a:ext cx="3768811" cy="1266632"/>
+            <a:off x="4215560" y="1690688"/>
+            <a:ext cx="5502875" cy="1266632"/>
           </a:xfrm>
           <a:prstGeom prst="roundRect">
             <a:avLst/>
@@ -6523,13 +6655,13 @@
           <p:nvPr/>
         </p:nvCxnSpPr>
         <p:spPr>
-          <a:xfrm flipH="1" flipV="1">
-            <a:off x="8511143" y="2385276"/>
-            <a:ext cx="1" cy="3215942"/>
+          <a:xfrm flipV="1">
+            <a:off x="7984372" y="2324004"/>
+            <a:ext cx="1734063" cy="3215942"/>
           </a:xfrm>
           <a:prstGeom prst="bentConnector3">
             <a:avLst>
-              <a:gd name="adj1" fmla="val -22860000000"/>
+              <a:gd name="adj1" fmla="val 113183"/>
             </a:avLst>
           </a:prstGeom>
           <a:ln w="38100">
@@ -6572,8 +6704,8 @@
         </p:nvCxnSpPr>
         <p:spPr>
           <a:xfrm flipV="1">
-            <a:off x="5595974" y="3018592"/>
-            <a:ext cx="1030764" cy="535990"/>
+            <a:off x="5069202" y="2957320"/>
+            <a:ext cx="1897796" cy="535990"/>
           </a:xfrm>
           <a:prstGeom prst="straightConnector1">
             <a:avLst/>
@@ -6620,8 +6752,8 @@
         </p:nvCxnSpPr>
         <p:spPr>
           <a:xfrm flipH="1" flipV="1">
-            <a:off x="6626738" y="3018592"/>
-            <a:ext cx="1017374" cy="535990"/>
+            <a:off x="6966998" y="2957320"/>
+            <a:ext cx="150342" cy="535990"/>
           </a:xfrm>
           <a:prstGeom prst="straightConnector1">
             <a:avLst/>
@@ -6664,7 +6796,7 @@
         </p:nvSpPr>
         <p:spPr>
           <a:xfrm>
-            <a:off x="2989731" y="3554582"/>
+            <a:off x="2462959" y="3493310"/>
             <a:ext cx="1478692" cy="877330"/>
           </a:xfrm>
           <a:prstGeom prst="roundRect">
@@ -6727,7 +6859,7 @@
         </p:nvCxnSpPr>
         <p:spPr>
           <a:xfrm flipH="1" flipV="1">
-            <a:off x="3729077" y="4431912"/>
+            <a:off x="3202305" y="4370640"/>
             <a:ext cx="1013256" cy="1169306"/>
           </a:xfrm>
           <a:prstGeom prst="straightConnector1">
@@ -6773,7 +6905,7 @@
         </p:nvCxnSpPr>
         <p:spPr>
           <a:xfrm flipH="1">
-            <a:off x="3729077" y="2385276"/>
+            <a:off x="3202305" y="2324004"/>
             <a:ext cx="1013255" cy="1169306"/>
           </a:xfrm>
           <a:prstGeom prst="straightConnector1">
@@ -6801,6 +6933,81 @@
           </a:fontRef>
         </p:style>
       </p:cxnSp>
+      <p:sp>
+        <p:nvSpPr>
+          <p:cNvPr id="18" name="Rounded Rectangle 17">
+            <a:extLst>
+              <a:ext uri="{FF2B5EF4-FFF2-40B4-BE49-F238E27FC236}">
+                <a16:creationId xmlns:a16="http://schemas.microsoft.com/office/drawing/2014/main" id="{633A54D1-42DC-6B31-8CAC-F8596E46BA4F}"/>
+              </a:ext>
+            </a:extLst>
+          </p:cNvPr>
+          <p:cNvSpPr/>
+          <p:nvPr/>
+        </p:nvSpPr>
+        <p:spPr>
+          <a:xfrm>
+            <a:off x="7984371" y="1885339"/>
+            <a:ext cx="1478692" cy="877330"/>
+          </a:xfrm>
+          <a:prstGeom prst="roundRect">
+            <a:avLst/>
+          </a:prstGeom>
+          <a:solidFill>
+            <a:schemeClr val="accent1"/>
+          </a:solidFill>
+          <a:ln w="12700">
+            <a:noFill/>
+          </a:ln>
+        </p:spPr>
+        <p:style>
+          <a:lnRef idx="2">
+            <a:schemeClr val="accent1">
+              <a:shade val="15000"/>
+            </a:schemeClr>
+          </a:lnRef>
+          <a:fillRef idx="1">
+            <a:schemeClr val="accent1"/>
+          </a:fillRef>
+          <a:effectRef idx="0">
+            <a:schemeClr val="accent1"/>
+          </a:effectRef>
+          <a:fontRef idx="minor">
+            <a:schemeClr val="lt1"/>
+          </a:fontRef>
+        </p:style>
+        <p:txBody>
+          <a:bodyPr rtlCol="0" anchor="ctr"/>
+          <a:lstStyle/>
+          <a:p>
+            <a:pPr algn="ctr"/>
+            <a:r>
+              <a:rPr lang="en-US" sz="1600" b="1" dirty="0">
+                <a:solidFill>
+                  <a:schemeClr val="accent3"/>
+                </a:solidFill>
+              </a:rPr>
+              <a:t>LEADS </a:t>
+            </a:r>
+            <a:r>
+              <a:rPr lang="en-US" sz="1600" b="1" dirty="0" err="1">
+                <a:solidFill>
+                  <a:schemeClr val="accent3"/>
+                </a:solidFill>
+              </a:rPr>
+              <a:t>VeC</a:t>
+            </a:r>
+            <a:r>
+              <a:rPr lang="en-US" sz="1600" b="1" dirty="0">
+                <a:solidFill>
+                  <a:schemeClr val="accent3"/>
+                </a:solidFill>
+              </a:rPr>
+              <a:t> DP</a:t>
+            </a:r>
+          </a:p>
+        </p:txBody>
+      </p:sp>
     </p:spTree>
     <p:extLst>
       <p:ext uri="{BB962C8B-B14F-4D97-AF65-F5344CB8AC3E}">
@@ -6929,7 +7136,7 @@
                                     </p:set>
                                     <p:animEffect transition="in" filter="wipe(down)">
                                       <p:cBhvr>
-                                        <p:cTn id="13" dur="500"/>
+                                        <p:cTn id="13" dur="200"/>
                                         <p:tgtEl>
                                           <p:spTgt spid="20"/>
                                         </p:tgtEl>
@@ -6944,7 +7151,7 @@
                         <p:par>
                           <p:cTn id="14" fill="hold">
                             <p:stCondLst>
-                              <p:cond delay="500"/>
+                              <p:cond delay="200"/>
                             </p:stCondLst>
                             <p:childTnLst>
                               <p:par>
@@ -6973,7 +7180,7 @@
                                     </p:set>
                                     <p:animEffect transition="in" filter="wipe(down)">
                                       <p:cBhvr>
-                                        <p:cTn id="17" dur="500"/>
+                                        <p:cTn id="17" dur="200"/>
                                         <p:tgtEl>
                                           <p:spTgt spid="27"/>
                                         </p:tgtEl>
@@ -7008,7 +7215,7 @@
                                     </p:set>
                                     <p:animEffect transition="in" filter="wipe(down)">
                                       <p:cBhvr>
-                                        <p:cTn id="20" dur="500"/>
+                                        <p:cTn id="20" dur="200"/>
                                         <p:tgtEl>
                                           <p:spTgt spid="23"/>
                                         </p:tgtEl>
@@ -7023,7 +7230,7 @@
                         <p:par>
                           <p:cTn id="21" fill="hold">
                             <p:stCondLst>
-                              <p:cond delay="1000"/>
+                              <p:cond delay="400"/>
                             </p:stCondLst>
                             <p:childTnLst>
                               <p:par>
@@ -7052,7 +7259,7 @@
                                     </p:set>
                                     <p:animEffect transition="in" filter="wipe(down)">
                                       <p:cBhvr>
-                                        <p:cTn id="24" dur="500"/>
+                                        <p:cTn id="24" dur="200"/>
                                         <p:tgtEl>
                                           <p:spTgt spid="17"/>
                                         </p:tgtEl>
@@ -7087,7 +7294,7 @@
                                     </p:set>
                                     <p:animEffect transition="in" filter="wipe(down)">
                                       <p:cBhvr>
-                                        <p:cTn id="27" dur="500"/>
+                                        <p:cTn id="27" dur="200"/>
                                         <p:tgtEl>
                                           <p:spTgt spid="14"/>
                                         </p:tgtEl>
@@ -7140,7 +7347,7 @@
                                     </p:set>
                                     <p:animEffect transition="in" filter="wipe(down)">
                                       <p:cBhvr>
-                                        <p:cTn id="32" dur="500"/>
+                                        <p:cTn id="32" dur="200"/>
                                         <p:tgtEl>
                                           <p:spTgt spid="37"/>
                                         </p:tgtEl>
@@ -7155,7 +7362,7 @@
                         <p:par>
                           <p:cTn id="33" fill="hold">
                             <p:stCondLst>
-                              <p:cond delay="500"/>
+                              <p:cond delay="200"/>
                             </p:stCondLst>
                             <p:childTnLst>
                               <p:par>
@@ -7184,7 +7391,7 @@
                                     </p:set>
                                     <p:animEffect transition="in" filter="wipe(right)">
                                       <p:cBhvr>
-                                        <p:cTn id="36" dur="500"/>
+                                        <p:cTn id="36" dur="200"/>
                                         <p:tgtEl>
                                           <p:spTgt spid="35"/>
                                         </p:tgtEl>
@@ -7207,6 +7414,50 @@
                                           </p:stCondLst>
                                         </p:cTn>
                                         <p:tgtEl>
+                                          <p:spTgt spid="18"/>
+                                        </p:tgtEl>
+                                        <p:attrNameLst>
+                                          <p:attrName>style.visibility</p:attrName>
+                                        </p:attrNameLst>
+                                      </p:cBhvr>
+                                      <p:to>
+                                        <p:strVal val="visible"/>
+                                      </p:to>
+                                    </p:set>
+                                    <p:animEffect transition="in" filter="wipe(right)">
+                                      <p:cBhvr>
+                                        <p:cTn id="39" dur="200"/>
+                                        <p:tgtEl>
+                                          <p:spTgt spid="18"/>
+                                        </p:tgtEl>
+                                      </p:cBhvr>
+                                    </p:animEffect>
+                                  </p:childTnLst>
+                                </p:cTn>
+                              </p:par>
+                            </p:childTnLst>
+                          </p:cTn>
+                        </p:par>
+                        <p:par>
+                          <p:cTn id="40" fill="hold">
+                            <p:stCondLst>
+                              <p:cond delay="400"/>
+                            </p:stCondLst>
+                            <p:childTnLst>
+                              <p:par>
+                                <p:cTn id="41" presetID="22" presetClass="entr" presetSubtype="2" fill="hold" grpId="0" nodeType="afterEffect">
+                                  <p:stCondLst>
+                                    <p:cond delay="0"/>
+                                  </p:stCondLst>
+                                  <p:childTnLst>
+                                    <p:set>
+                                      <p:cBhvr>
+                                        <p:cTn id="42" dur="1" fill="hold">
+                                          <p:stCondLst>
+                                            <p:cond delay="0"/>
+                                          </p:stCondLst>
+                                        </p:cTn>
+                                        <p:tgtEl>
                                           <p:spTgt spid="34"/>
                                         </p:tgtEl>
                                         <p:attrNameLst>
@@ -7219,7 +7470,7 @@
                                     </p:set>
                                     <p:animEffect transition="in" filter="wipe(right)">
                                       <p:cBhvr>
-                                        <p:cTn id="39" dur="500"/>
+                                        <p:cTn id="43" dur="200"/>
                                         <p:tgtEl>
                                           <p:spTgt spid="34"/>
                                         </p:tgtEl>
@@ -7232,20 +7483,20 @@
                           </p:cTn>
                         </p:par>
                         <p:par>
-                          <p:cTn id="40" fill="hold">
+                          <p:cTn id="44" fill="hold">
                             <p:stCondLst>
-                              <p:cond delay="1000"/>
+                              <p:cond delay="600"/>
                             </p:stCondLst>
                             <p:childTnLst>
                               <p:par>
-                                <p:cTn id="41" presetID="22" presetClass="entr" presetSubtype="2" fill="hold" grpId="0" nodeType="afterEffect">
+                                <p:cTn id="45" presetID="22" presetClass="entr" presetSubtype="2" fill="hold" grpId="0" nodeType="afterEffect">
                                   <p:stCondLst>
                                     <p:cond delay="0"/>
                                   </p:stCondLst>
                                   <p:childTnLst>
                                     <p:set>
                                       <p:cBhvr>
-                                        <p:cTn id="42" dur="1" fill="hold">
+                                        <p:cTn id="46" dur="1" fill="hold">
                                           <p:stCondLst>
                                             <p:cond delay="0"/>
                                           </p:stCondLst>
@@ -7263,7 +7514,7 @@
                                     </p:set>
                                     <p:animEffect transition="in" filter="wipe(right)">
                                       <p:cBhvr>
-                                        <p:cTn id="43" dur="500"/>
+                                        <p:cTn id="47" dur="200"/>
                                         <p:tgtEl>
                                           <p:spTgt spid="33"/>
                                         </p:tgtEl>
@@ -7279,26 +7530,26 @@
                     </p:cTn>
                   </p:par>
                   <p:par>
-                    <p:cTn id="44" fill="hold">
+                    <p:cTn id="48" fill="hold">
                       <p:stCondLst>
                         <p:cond delay="indefinite"/>
                       </p:stCondLst>
                       <p:childTnLst>
                         <p:par>
-                          <p:cTn id="45" fill="hold">
+                          <p:cTn id="49" fill="hold">
                             <p:stCondLst>
                               <p:cond delay="0"/>
                             </p:stCondLst>
                             <p:childTnLst>
                               <p:par>
-                                <p:cTn id="46" presetID="22" presetClass="entr" presetSubtype="4" fill="hold" nodeType="clickEffect">
+                                <p:cTn id="50" presetID="22" presetClass="entr" presetSubtype="4" fill="hold" nodeType="clickEffect">
                                   <p:stCondLst>
                                     <p:cond delay="0"/>
                                   </p:stCondLst>
                                   <p:childTnLst>
                                     <p:set>
                                       <p:cBhvr>
-                                        <p:cTn id="47" dur="1" fill="hold">
+                                        <p:cTn id="51" dur="1" fill="hold">
                                           <p:stCondLst>
                                             <p:cond delay="0"/>
                                           </p:stCondLst>
@@ -7316,7 +7567,7 @@
                                     </p:set>
                                     <p:animEffect transition="in" filter="wipe(down)">
                                       <p:cBhvr>
-                                        <p:cTn id="48" dur="500"/>
+                                        <p:cTn id="52" dur="200"/>
                                         <p:tgtEl>
                                           <p:spTgt spid="48"/>
                                         </p:tgtEl>
@@ -7326,14 +7577,14 @@
                                 </p:cTn>
                               </p:par>
                               <p:par>
-                                <p:cTn id="49" presetID="22" presetClass="entr" presetSubtype="4" fill="hold" nodeType="withEffect">
+                                <p:cTn id="53" presetID="22" presetClass="entr" presetSubtype="4" fill="hold" nodeType="withEffect">
                                   <p:stCondLst>
                                     <p:cond delay="0"/>
                                   </p:stCondLst>
                                   <p:childTnLst>
                                     <p:set>
                                       <p:cBhvr>
-                                        <p:cTn id="50" dur="1" fill="hold">
+                                        <p:cTn id="54" dur="1" fill="hold">
                                           <p:stCondLst>
                                             <p:cond delay="0"/>
                                           </p:stCondLst>
@@ -7351,7 +7602,7 @@
                                     </p:set>
                                     <p:animEffect transition="in" filter="wipe(down)">
                                       <p:cBhvr>
-                                        <p:cTn id="51" dur="500"/>
+                                        <p:cTn id="55" dur="200"/>
                                         <p:tgtEl>
                                           <p:spTgt spid="51"/>
                                         </p:tgtEl>
@@ -7367,26 +7618,26 @@
                     </p:cTn>
                   </p:par>
                   <p:par>
-                    <p:cTn id="52" fill="hold">
+                    <p:cTn id="56" fill="hold">
                       <p:stCondLst>
                         <p:cond delay="indefinite"/>
                       </p:stCondLst>
                       <p:childTnLst>
                         <p:par>
-                          <p:cTn id="53" fill="hold">
+                          <p:cTn id="57" fill="hold">
                             <p:stCondLst>
                               <p:cond delay="0"/>
                             </p:stCondLst>
                             <p:childTnLst>
                               <p:par>
-                                <p:cTn id="54" presetID="22" presetClass="entr" presetSubtype="1" fill="hold" nodeType="clickEffect">
+                                <p:cTn id="58" presetID="22" presetClass="entr" presetSubtype="1" fill="hold" nodeType="clickEffect">
                                   <p:stCondLst>
                                     <p:cond delay="0"/>
                                   </p:stCondLst>
                                   <p:childTnLst>
                                     <p:set>
                                       <p:cBhvr>
-                                        <p:cTn id="55" dur="1" fill="hold">
+                                        <p:cTn id="59" dur="1" fill="hold">
                                           <p:stCondLst>
                                             <p:cond delay="0"/>
                                           </p:stCondLst>
@@ -7404,7 +7655,7 @@
                                     </p:set>
                                     <p:animEffect transition="in" filter="wipe(up)">
                                       <p:cBhvr>
-                                        <p:cTn id="56" dur="500"/>
+                                        <p:cTn id="60" dur="200"/>
                                         <p:tgtEl>
                                           <p:spTgt spid="63"/>
                                         </p:tgtEl>
@@ -7414,14 +7665,14 @@
                                 </p:cTn>
                               </p:par>
                               <p:par>
-                                <p:cTn id="57" presetID="22" presetClass="entr" presetSubtype="4" fill="hold" nodeType="withEffect">
+                                <p:cTn id="61" presetID="22" presetClass="entr" presetSubtype="4" fill="hold" nodeType="withEffect">
                                   <p:stCondLst>
                                     <p:cond delay="0"/>
                                   </p:stCondLst>
                                   <p:childTnLst>
                                     <p:set>
                                       <p:cBhvr>
-                                        <p:cTn id="58" dur="1" fill="hold">
+                                        <p:cTn id="62" dur="1" fill="hold">
                                           <p:stCondLst>
                                             <p:cond delay="0"/>
                                           </p:stCondLst>
@@ -7439,7 +7690,7 @@
                                     </p:set>
                                     <p:animEffect transition="in" filter="wipe(down)">
                                       <p:cBhvr>
-                                        <p:cTn id="59" dur="500"/>
+                                        <p:cTn id="63" dur="200"/>
                                         <p:tgtEl>
                                           <p:spTgt spid="58"/>
                                         </p:tgtEl>
@@ -7452,20 +7703,20 @@
                           </p:cTn>
                         </p:par>
                         <p:par>
-                          <p:cTn id="60" fill="hold">
+                          <p:cTn id="64" fill="hold">
                             <p:stCondLst>
-                              <p:cond delay="500"/>
+                              <p:cond delay="200"/>
                             </p:stCondLst>
                             <p:childTnLst>
                               <p:par>
-                                <p:cTn id="61" presetID="10" presetClass="entr" presetSubtype="0" fill="hold" grpId="0" nodeType="afterEffect">
+                                <p:cTn id="65" presetID="10" presetClass="entr" presetSubtype="0" fill="hold" grpId="0" nodeType="afterEffect">
                                   <p:stCondLst>
                                     <p:cond delay="0"/>
                                   </p:stCondLst>
                                   <p:childTnLst>
                                     <p:set>
                                       <p:cBhvr>
-                                        <p:cTn id="62" dur="1" fill="hold">
+                                        <p:cTn id="66" dur="1" fill="hold">
                                           <p:stCondLst>
                                             <p:cond delay="0"/>
                                           </p:stCondLst>
@@ -7483,7 +7734,7 @@
                                     </p:set>
                                     <p:animEffect transition="in" filter="fade">
                                       <p:cBhvr>
-                                        <p:cTn id="63" dur="500"/>
+                                        <p:cTn id="67" dur="200"/>
                                         <p:tgtEl>
                                           <p:spTgt spid="57"/>
                                         </p:tgtEl>
@@ -7529,6 +7780,7 @@
       <p:bldP spid="34" grpId="0" animBg="1"/>
       <p:bldP spid="35" grpId="0" animBg="1"/>
       <p:bldP spid="57" grpId="0" animBg="1"/>
+      <p:bldP spid="18" grpId="0" animBg="1"/>
     </p:bldLst>
   </p:timing>
 </p:sld>

</xml_diff>

<commit_message>
Add a New Executable Module `leads_vec_dp` (#344)
* Optimized dependency profiles. (#340)

* Added `leads_vec_dp`. (#340)

* Docs. (#340)

* Improved workflow. (#340)

* Updated pyproject.toml. (#340)

* Code reformatted. (#340)

* Code reformatted. (#340)

* Added dependency `pyyaml`. (#340)

* Docs. (#340)

* Supported inferences. (#340)

* Added an output for `InferredDataset.complete()`. (#340)

* Code reformatted. (#340)

* Added `latency_invalid()`. (#340)

* Bug fixed: new latency is negative. (#340)

* Code reformatted. (#340)

* Code reformatted. (#340)

* Bug fixed: avoided `nan`s. (#340)

* Bug fixed: avoided `nan`s. (#340)

* Supported visual data analysis. (#340)

* Added commands. (#340)

* Code reformatted. (#340)

* Docs. (#340)

* Added command `save-as`. (#340)

* Updated LEADS.pptx. (#316) (#340)

---------

Signed-off-by: Terry Fu <futerry@outlook.com>
</commit_message>
<xml_diff>
--- a/docs/LEADS.pptx
+++ b/docs/LEADS.pptx
@@ -124,7 +124,7 @@
 <file path=ppt/revisionInfo.xml><?xml version="1.0" encoding="utf-8"?>
 <p1510:revInfo xmlns:a="http://schemas.openxmlformats.org/drawingml/2006/main" xmlns:r="http://schemas.openxmlformats.org/officeDocument/2006/relationships" xmlns:p1510="http://schemas.microsoft.com/office/powerpoint/2015/10/main">
   <p1510:revLst>
-    <p1510:client id="{2628F682-DF01-404E-B59F-6BDA13BCEEDE}" v="331" dt="2024-07-26T15:26:56.481"/>
+    <p1510:client id="{2628F682-DF01-404E-B59F-6BDA13BCEEDE}" v="442" dt="2024-08-04T07:19:31.138"/>
   </p1510:revLst>
 </p1510:revInfo>
 </file>
@@ -134,7 +134,7 @@
   <pc:docChgLst>
     <pc:chgData name="Tianhao Fu" userId="3c5ffcaadea6c056" providerId="LiveId" clId="{2628F682-DF01-404E-B59F-6BDA13BCEEDE}"/>
     <pc:docChg chg="undo custSel addSld delSld modSld sldOrd modMainMaster">
-      <pc:chgData name="Tianhao Fu" userId="3c5ffcaadea6c056" providerId="LiveId" clId="{2628F682-DF01-404E-B59F-6BDA13BCEEDE}" dt="2024-07-26T15:45:30.942" v="5542" actId="2696"/>
+      <pc:chgData name="Tianhao Fu" userId="3c5ffcaadea6c056" providerId="LiveId" clId="{2628F682-DF01-404E-B59F-6BDA13BCEEDE}" dt="2024-08-04T07:19:41.995" v="5706" actId="478"/>
       <pc:docMkLst>
         <pc:docMk/>
       </pc:docMkLst>
@@ -335,8 +335,8 @@
           </ac:spMkLst>
         </pc:spChg>
       </pc:sldChg>
-      <pc:sldChg chg="addSp delSp modSp new mod ord setBg modAnim">
-        <pc:chgData name="Tianhao Fu" userId="3c5ffcaadea6c056" providerId="LiveId" clId="{2628F682-DF01-404E-B59F-6BDA13BCEEDE}" dt="2024-07-26T12:14:40.563" v="5135"/>
+      <pc:sldChg chg="addSp delSp modSp new mod ord setBg delAnim modAnim">
+        <pc:chgData name="Tianhao Fu" userId="3c5ffcaadea6c056" providerId="LiveId" clId="{2628F682-DF01-404E-B59F-6BDA13BCEEDE}" dt="2024-08-04T07:19:41.995" v="5706" actId="478"/>
         <pc:sldMkLst>
           <pc:docMk/>
           <pc:sldMk cId="1881318779" sldId="259"/>
@@ -430,7 +430,7 @@
           </ac:spMkLst>
         </pc:spChg>
         <pc:spChg chg="add mod">
-          <ac:chgData name="Tianhao Fu" userId="3c5ffcaadea6c056" providerId="LiveId" clId="{2628F682-DF01-404E-B59F-6BDA13BCEEDE}" dt="2024-07-25T04:52:19.708" v="3500" actId="207"/>
+          <ac:chgData name="Tianhao Fu" userId="3c5ffcaadea6c056" providerId="LiveId" clId="{2628F682-DF01-404E-B59F-6BDA13BCEEDE}" dt="2024-08-04T07:14:24.446" v="5596" actId="12788"/>
           <ac:spMkLst>
             <pc:docMk/>
             <pc:sldMk cId="1881318779" sldId="259"/>
@@ -438,7 +438,7 @@
           </ac:spMkLst>
         </pc:spChg>
         <pc:spChg chg="add mod">
-          <ac:chgData name="Tianhao Fu" userId="3c5ffcaadea6c056" providerId="LiveId" clId="{2628F682-DF01-404E-B59F-6BDA13BCEEDE}" dt="2024-07-25T04:52:19.708" v="3500" actId="207"/>
+          <ac:chgData name="Tianhao Fu" userId="3c5ffcaadea6c056" providerId="LiveId" clId="{2628F682-DF01-404E-B59F-6BDA13BCEEDE}" dt="2024-08-04T07:14:24.446" v="5596" actId="12788"/>
           <ac:spMkLst>
             <pc:docMk/>
             <pc:sldMk cId="1881318779" sldId="259"/>
@@ -446,7 +446,7 @@
           </ac:spMkLst>
         </pc:spChg>
         <pc:spChg chg="add mod">
-          <ac:chgData name="Tianhao Fu" userId="3c5ffcaadea6c056" providerId="LiveId" clId="{2628F682-DF01-404E-B59F-6BDA13BCEEDE}" dt="2024-07-25T04:52:19.708" v="3500" actId="207"/>
+          <ac:chgData name="Tianhao Fu" userId="3c5ffcaadea6c056" providerId="LiveId" clId="{2628F682-DF01-404E-B59F-6BDA13BCEEDE}" dt="2024-08-04T07:14:24.446" v="5596" actId="12788"/>
           <ac:spMkLst>
             <pc:docMk/>
             <pc:sldMk cId="1881318779" sldId="259"/>
@@ -462,7 +462,15 @@
           </ac:spMkLst>
         </pc:spChg>
         <pc:spChg chg="add mod">
-          <ac:chgData name="Tianhao Fu" userId="3c5ffcaadea6c056" providerId="LiveId" clId="{2628F682-DF01-404E-B59F-6BDA13BCEEDE}" dt="2024-07-25T05:09:03.662" v="3975" actId="208"/>
+          <ac:chgData name="Tianhao Fu" userId="3c5ffcaadea6c056" providerId="LiveId" clId="{2628F682-DF01-404E-B59F-6BDA13BCEEDE}" dt="2024-08-04T07:19:26.989" v="5702" actId="1076"/>
+          <ac:spMkLst>
+            <pc:docMk/>
+            <pc:sldMk cId="1881318779" sldId="259"/>
+            <ac:spMk id="18" creationId="{633A54D1-42DC-6B31-8CAC-F8596E46BA4F}"/>
+          </ac:spMkLst>
+        </pc:spChg>
+        <pc:spChg chg="add mod">
+          <ac:chgData name="Tianhao Fu" userId="3c5ffcaadea6c056" providerId="LiveId" clId="{2628F682-DF01-404E-B59F-6BDA13BCEEDE}" dt="2024-08-04T07:14:24.446" v="5596" actId="12788"/>
           <ac:spMkLst>
             <pc:docMk/>
             <pc:sldMk cId="1881318779" sldId="259"/>
@@ -470,7 +478,7 @@
           </ac:spMkLst>
         </pc:spChg>
         <pc:spChg chg="add mod">
-          <ac:chgData name="Tianhao Fu" userId="3c5ffcaadea6c056" providerId="LiveId" clId="{2628F682-DF01-404E-B59F-6BDA13BCEEDE}" dt="2024-07-25T04:52:19.708" v="3500" actId="207"/>
+          <ac:chgData name="Tianhao Fu" userId="3c5ffcaadea6c056" providerId="LiveId" clId="{2628F682-DF01-404E-B59F-6BDA13BCEEDE}" dt="2024-08-04T07:14:24.446" v="5596" actId="12788"/>
           <ac:spMkLst>
             <pc:docMk/>
             <pc:sldMk cId="1881318779" sldId="259"/>
@@ -486,6 +494,14 @@
           </ac:spMkLst>
         </pc:spChg>
         <pc:spChg chg="add del mod">
+          <ac:chgData name="Tianhao Fu" userId="3c5ffcaadea6c056" providerId="LiveId" clId="{2628F682-DF01-404E-B59F-6BDA13BCEEDE}" dt="2024-08-04T07:11:58.911" v="5565" actId="478"/>
+          <ac:spMkLst>
+            <pc:docMk/>
+            <pc:sldMk cId="1881318779" sldId="259"/>
+            <ac:spMk id="31" creationId="{629F633C-8070-0429-E64A-D04CCAF05489}"/>
+          </ac:spMkLst>
+        </pc:spChg>
+        <pc:spChg chg="add del mod">
           <ac:chgData name="Tianhao Fu" userId="3c5ffcaadea6c056" providerId="LiveId" clId="{2628F682-DF01-404E-B59F-6BDA13BCEEDE}" dt="2024-07-24T04:47:37.893" v="381" actId="478"/>
           <ac:spMkLst>
             <pc:docMk/>
@@ -502,7 +518,7 @@
           </ac:spMkLst>
         </pc:spChg>
         <pc:spChg chg="add mod">
-          <ac:chgData name="Tianhao Fu" userId="3c5ffcaadea6c056" providerId="LiveId" clId="{2628F682-DF01-404E-B59F-6BDA13BCEEDE}" dt="2024-07-25T04:52:14.166" v="3499" actId="207"/>
+          <ac:chgData name="Tianhao Fu" userId="3c5ffcaadea6c056" providerId="LiveId" clId="{2628F682-DF01-404E-B59F-6BDA13BCEEDE}" dt="2024-08-04T07:14:54.540" v="5602" actId="12789"/>
           <ac:spMkLst>
             <pc:docMk/>
             <pc:sldMk cId="1881318779" sldId="259"/>
@@ -510,7 +526,7 @@
           </ac:spMkLst>
         </pc:spChg>
         <pc:spChg chg="add mod">
-          <ac:chgData name="Tianhao Fu" userId="3c5ffcaadea6c056" providerId="LiveId" clId="{2628F682-DF01-404E-B59F-6BDA13BCEEDE}" dt="2024-07-25T04:52:19.708" v="3500" actId="207"/>
+          <ac:chgData name="Tianhao Fu" userId="3c5ffcaadea6c056" providerId="LiveId" clId="{2628F682-DF01-404E-B59F-6BDA13BCEEDE}" dt="2024-08-04T07:14:54.540" v="5602" actId="12789"/>
           <ac:spMkLst>
             <pc:docMk/>
             <pc:sldMk cId="1881318779" sldId="259"/>
@@ -518,7 +534,7 @@
           </ac:spMkLst>
         </pc:spChg>
         <pc:spChg chg="add mod">
-          <ac:chgData name="Tianhao Fu" userId="3c5ffcaadea6c056" providerId="LiveId" clId="{2628F682-DF01-404E-B59F-6BDA13BCEEDE}" dt="2024-07-25T05:08:39.923" v="3967" actId="208"/>
+          <ac:chgData name="Tianhao Fu" userId="3c5ffcaadea6c056" providerId="LiveId" clId="{2628F682-DF01-404E-B59F-6BDA13BCEEDE}" dt="2024-08-04T07:19:41.010" v="5705" actId="14100"/>
           <ac:spMkLst>
             <pc:docMk/>
             <pc:sldMk cId="1881318779" sldId="259"/>
@@ -526,6 +542,14 @@
           </ac:spMkLst>
         </pc:spChg>
         <pc:spChg chg="add del mod">
+          <ac:chgData name="Tianhao Fu" userId="3c5ffcaadea6c056" providerId="LiveId" clId="{2628F682-DF01-404E-B59F-6BDA13BCEEDE}" dt="2024-08-04T07:12:15.649" v="5569" actId="478"/>
+          <ac:spMkLst>
+            <pc:docMk/>
+            <pc:sldMk cId="1881318779" sldId="259"/>
+            <ac:spMk id="49" creationId="{28CAB8AC-8232-A8EB-0126-2D7203FB76E2}"/>
+          </ac:spMkLst>
+        </pc:spChg>
+        <pc:spChg chg="add del mod">
           <ac:chgData name="Tianhao Fu" userId="3c5ffcaadea6c056" providerId="LiveId" clId="{2628F682-DF01-404E-B59F-6BDA13BCEEDE}" dt="2024-07-24T09:07:36.532" v="2255" actId="478"/>
           <ac:spMkLst>
             <pc:docMk/>
@@ -534,11 +558,19 @@
           </ac:spMkLst>
         </pc:spChg>
         <pc:spChg chg="add mod">
-          <ac:chgData name="Tianhao Fu" userId="3c5ffcaadea6c056" providerId="LiveId" clId="{2628F682-DF01-404E-B59F-6BDA13BCEEDE}" dt="2024-07-25T04:52:09.958" v="3498" actId="207"/>
+          <ac:chgData name="Tianhao Fu" userId="3c5ffcaadea6c056" providerId="LiveId" clId="{2628F682-DF01-404E-B59F-6BDA13BCEEDE}" dt="2024-08-04T07:14:24.446" v="5596" actId="12788"/>
           <ac:spMkLst>
             <pc:docMk/>
             <pc:sldMk cId="1881318779" sldId="259"/>
             <ac:spMk id="57" creationId="{8852AD21-42C3-6AD8-C6F1-C6DBEF6E96F2}"/>
+          </ac:spMkLst>
+        </pc:spChg>
+        <pc:spChg chg="add del mod">
+          <ac:chgData name="Tianhao Fu" userId="3c5ffcaadea6c056" providerId="LiveId" clId="{2628F682-DF01-404E-B59F-6BDA13BCEEDE}" dt="2024-08-04T07:19:41.995" v="5706" actId="478"/>
+          <ac:spMkLst>
+            <pc:docMk/>
+            <pc:sldMk cId="1881318779" sldId="259"/>
+            <ac:spMk id="61" creationId="{4F3AD185-B40A-7B57-8CC1-33D6CB8DE190}"/>
           </ac:spMkLst>
         </pc:spChg>
         <pc:cxnChg chg="add del mod">
@@ -550,7 +582,7 @@
           </ac:cxnSpMkLst>
         </pc:cxnChg>
         <pc:cxnChg chg="add mod">
-          <ac:chgData name="Tianhao Fu" userId="3c5ffcaadea6c056" providerId="LiveId" clId="{2628F682-DF01-404E-B59F-6BDA13BCEEDE}" dt="2024-07-25T05:08:59.134" v="3973" actId="208"/>
+          <ac:chgData name="Tianhao Fu" userId="3c5ffcaadea6c056" providerId="LiveId" clId="{2628F682-DF01-404E-B59F-6BDA13BCEEDE}" dt="2024-08-04T07:14:24.446" v="5596" actId="12788"/>
           <ac:cxnSpMkLst>
             <pc:docMk/>
             <pc:sldMk cId="1881318779" sldId="259"/>
@@ -558,7 +590,7 @@
           </ac:cxnSpMkLst>
         </pc:cxnChg>
         <pc:cxnChg chg="add mod">
-          <ac:chgData name="Tianhao Fu" userId="3c5ffcaadea6c056" providerId="LiveId" clId="{2628F682-DF01-404E-B59F-6BDA13BCEEDE}" dt="2024-07-25T05:09:01.458" v="3974" actId="208"/>
+          <ac:chgData name="Tianhao Fu" userId="3c5ffcaadea6c056" providerId="LiveId" clId="{2628F682-DF01-404E-B59F-6BDA13BCEEDE}" dt="2024-08-04T07:14:24.446" v="5596" actId="12788"/>
           <ac:cxnSpMkLst>
             <pc:docMk/>
             <pc:sldMk cId="1881318779" sldId="259"/>
@@ -566,7 +598,7 @@
           </ac:cxnSpMkLst>
         </pc:cxnChg>
         <pc:cxnChg chg="add del mod">
-          <ac:chgData name="Tianhao Fu" userId="3c5ffcaadea6c056" providerId="LiveId" clId="{2628F682-DF01-404E-B59F-6BDA13BCEEDE}" dt="2024-07-25T05:08:51.078" v="3970" actId="208"/>
+          <ac:chgData name="Tianhao Fu" userId="3c5ffcaadea6c056" providerId="LiveId" clId="{2628F682-DF01-404E-B59F-6BDA13BCEEDE}" dt="2024-08-04T07:19:41.010" v="5705" actId="14100"/>
           <ac:cxnSpMkLst>
             <pc:docMk/>
             <pc:sldMk cId="1881318779" sldId="259"/>
@@ -574,7 +606,7 @@
           </ac:cxnSpMkLst>
         </pc:cxnChg>
         <pc:cxnChg chg="add mod">
-          <ac:chgData name="Tianhao Fu" userId="3c5ffcaadea6c056" providerId="LiveId" clId="{2628F682-DF01-404E-B59F-6BDA13BCEEDE}" dt="2024-07-25T05:08:53.577" v="3971" actId="208"/>
+          <ac:chgData name="Tianhao Fu" userId="3c5ffcaadea6c056" providerId="LiveId" clId="{2628F682-DF01-404E-B59F-6BDA13BCEEDE}" dt="2024-08-04T07:19:41.010" v="5705" actId="14100"/>
           <ac:cxnSpMkLst>
             <pc:docMk/>
             <pc:sldMk cId="1881318779" sldId="259"/>
@@ -582,23 +614,39 @@
           </ac:cxnSpMkLst>
         </pc:cxnChg>
         <pc:cxnChg chg="add del mod">
-          <ac:chgData name="Tianhao Fu" userId="3c5ffcaadea6c056" providerId="LiveId" clId="{2628F682-DF01-404E-B59F-6BDA13BCEEDE}" dt="2024-07-25T05:08:55.981" v="3972" actId="208"/>
+          <ac:chgData name="Tianhao Fu" userId="3c5ffcaadea6c056" providerId="LiveId" clId="{2628F682-DF01-404E-B59F-6BDA13BCEEDE}" dt="2024-08-04T07:19:41.010" v="5705" actId="14100"/>
           <ac:cxnSpMkLst>
             <pc:docMk/>
             <pc:sldMk cId="1881318779" sldId="259"/>
             <ac:cxnSpMk id="51" creationId="{E167C354-8A79-6202-60C4-09454A54173B}"/>
           </ac:cxnSpMkLst>
         </pc:cxnChg>
+        <pc:cxnChg chg="add del mod">
+          <ac:chgData name="Tianhao Fu" userId="3c5ffcaadea6c056" providerId="LiveId" clId="{2628F682-DF01-404E-B59F-6BDA13BCEEDE}" dt="2024-08-04T07:13:16.935" v="5578" actId="478"/>
+          <ac:cxnSpMkLst>
+            <pc:docMk/>
+            <pc:sldMk cId="1881318779" sldId="259"/>
+            <ac:cxnSpMk id="56" creationId="{8E50110F-7AD6-8615-D123-26ADAFDCBBA0}"/>
+          </ac:cxnSpMkLst>
+        </pc:cxnChg>
         <pc:cxnChg chg="add mod">
-          <ac:chgData name="Tianhao Fu" userId="3c5ffcaadea6c056" providerId="LiveId" clId="{2628F682-DF01-404E-B59F-6BDA13BCEEDE}" dt="2024-07-25T05:08:47.740" v="3969" actId="208"/>
+          <ac:chgData name="Tianhao Fu" userId="3c5ffcaadea6c056" providerId="LiveId" clId="{2628F682-DF01-404E-B59F-6BDA13BCEEDE}" dt="2024-08-04T07:14:24.446" v="5596" actId="12788"/>
           <ac:cxnSpMkLst>
             <pc:docMk/>
             <pc:sldMk cId="1881318779" sldId="259"/>
             <ac:cxnSpMk id="58" creationId="{910A9505-960F-476E-1BD9-6676355CD59E}"/>
           </ac:cxnSpMkLst>
         </pc:cxnChg>
+        <pc:cxnChg chg="add del mod">
+          <ac:chgData name="Tianhao Fu" userId="3c5ffcaadea6c056" providerId="LiveId" clId="{2628F682-DF01-404E-B59F-6BDA13BCEEDE}" dt="2024-08-04T07:14:17.398" v="5594" actId="478"/>
+          <ac:cxnSpMkLst>
+            <pc:docMk/>
+            <pc:sldMk cId="1881318779" sldId="259"/>
+            <ac:cxnSpMk id="60" creationId="{FC728E53-813C-11CD-C950-453F3CE003FE}"/>
+          </ac:cxnSpMkLst>
+        </pc:cxnChg>
         <pc:cxnChg chg="add mod">
-          <ac:chgData name="Tianhao Fu" userId="3c5ffcaadea6c056" providerId="LiveId" clId="{2628F682-DF01-404E-B59F-6BDA13BCEEDE}" dt="2024-07-25T05:08:45.297" v="3968" actId="208"/>
+          <ac:chgData name="Tianhao Fu" userId="3c5ffcaadea6c056" providerId="LiveId" clId="{2628F682-DF01-404E-B59F-6BDA13BCEEDE}" dt="2024-08-04T07:19:41.010" v="5705" actId="14100"/>
           <ac:cxnSpMkLst>
             <pc:docMk/>
             <pc:sldMk cId="1881318779" sldId="259"/>
@@ -1204,7 +1252,7 @@
         </pc:cxnChg>
       </pc:sldChg>
       <pc:sldChg chg="addSp delSp modSp add mod setBg modAnim">
-        <pc:chgData name="Tianhao Fu" userId="3c5ffcaadea6c056" providerId="LiveId" clId="{2628F682-DF01-404E-B59F-6BDA13BCEEDE}" dt="2024-07-26T15:22:43.991" v="5529" actId="14100"/>
+        <pc:chgData name="Tianhao Fu" userId="3c5ffcaadea6c056" providerId="LiveId" clId="{2628F682-DF01-404E-B59F-6BDA13BCEEDE}" dt="2024-07-26T16:10:03.466" v="5544" actId="2085"/>
         <pc:sldMkLst>
           <pc:docMk/>
           <pc:sldMk cId="3766991575" sldId="264"/>
@@ -1506,7 +1554,7 @@
           </ac:spMkLst>
         </pc:spChg>
         <pc:spChg chg="add mod">
-          <ac:chgData name="Tianhao Fu" userId="3c5ffcaadea6c056" providerId="LiveId" clId="{2628F682-DF01-404E-B59F-6BDA13BCEEDE}" dt="2024-07-26T14:59:37.327" v="5426" actId="1076"/>
+          <ac:chgData name="Tianhao Fu" userId="3c5ffcaadea6c056" providerId="LiveId" clId="{2628F682-DF01-404E-B59F-6BDA13BCEEDE}" dt="2024-07-26T16:10:03.466" v="5544" actId="2085"/>
           <ac:spMkLst>
             <pc:docMk/>
             <pc:sldMk cId="3766991575" sldId="264"/>
@@ -1860,7 +1908,7 @@
           <a:p>
             <a:fld id="{0FC8290A-0E42-2F47-A033-0833A59CB4B8}" type="datetimeFigureOut">
               <a:rPr lang="en-US" smtClean="0"/>
-              <a:t>7/26/24</a:t>
+              <a:t>8/4/24</a:t>
             </a:fld>
             <a:endParaRPr lang="en-US"/>
           </a:p>
@@ -2295,6 +2343,90 @@
 </p:notes>
 </file>
 
+<file path=ppt/notesSlides/notesSlide3.xml><?xml version="1.0" encoding="utf-8"?>
+<p:notes xmlns:a="http://schemas.openxmlformats.org/drawingml/2006/main" xmlns:r="http://schemas.openxmlformats.org/officeDocument/2006/relationships" xmlns:p="http://schemas.openxmlformats.org/presentationml/2006/main">
+  <p:cSld>
+    <p:spTree>
+      <p:nvGrpSpPr>
+        <p:cNvPr id="1" name=""/>
+        <p:cNvGrpSpPr/>
+        <p:nvPr/>
+      </p:nvGrpSpPr>
+      <p:grpSpPr>
+        <a:xfrm>
+          <a:off x="0" y="0"/>
+          <a:ext cx="0" cy="0"/>
+          <a:chOff x="0" y="0"/>
+          <a:chExt cx="0" cy="0"/>
+        </a:xfrm>
+      </p:grpSpPr>
+      <p:sp>
+        <p:nvSpPr>
+          <p:cNvPr id="2" name="Slide Image Placeholder 1"/>
+          <p:cNvSpPr>
+            <a:spLocks noGrp="1" noRot="1" noChangeAspect="1"/>
+          </p:cNvSpPr>
+          <p:nvPr>
+            <p:ph type="sldImg"/>
+          </p:nvPr>
+        </p:nvSpPr>
+        <p:spPr/>
+      </p:sp>
+      <p:sp>
+        <p:nvSpPr>
+          <p:cNvPr id="3" name="Notes Placeholder 2"/>
+          <p:cNvSpPr>
+            <a:spLocks noGrp="1"/>
+          </p:cNvSpPr>
+          <p:nvPr>
+            <p:ph type="body" idx="1"/>
+          </p:nvPr>
+        </p:nvSpPr>
+        <p:spPr/>
+        <p:txBody>
+          <a:bodyPr/>
+          <a:lstStyle/>
+          <a:p>
+            <a:endParaRPr lang="en-US" dirty="0"/>
+          </a:p>
+        </p:txBody>
+      </p:sp>
+      <p:sp>
+        <p:nvSpPr>
+          <p:cNvPr id="4" name="Slide Number Placeholder 3"/>
+          <p:cNvSpPr>
+            <a:spLocks noGrp="1"/>
+          </p:cNvSpPr>
+          <p:nvPr>
+            <p:ph type="sldNum" sz="quarter" idx="5"/>
+          </p:nvPr>
+        </p:nvSpPr>
+        <p:spPr/>
+        <p:txBody>
+          <a:bodyPr/>
+          <a:lstStyle/>
+          <a:p>
+            <a:fld id="{7A965B42-9ED9-2B41-87DB-75DA12D8B177}" type="slidenum">
+              <a:rPr lang="en-US" smtClean="0"/>
+              <a:t>3</a:t>
+            </a:fld>
+            <a:endParaRPr lang="en-US"/>
+          </a:p>
+        </p:txBody>
+      </p:sp>
+    </p:spTree>
+    <p:extLst>
+      <p:ext uri="{BB962C8B-B14F-4D97-AF65-F5344CB8AC3E}">
+        <p14:creationId xmlns:p14="http://schemas.microsoft.com/office/powerpoint/2010/main" val="470147392"/>
+      </p:ext>
+    </p:extLst>
+  </p:cSld>
+  <p:clrMapOvr>
+    <a:masterClrMapping/>
+  </p:clrMapOvr>
+</p:notes>
+</file>
+
 <file path=ppt/slideLayouts/slideLayout1.xml><?xml version="1.0" encoding="utf-8"?>
 <p:sldLayout xmlns:a="http://schemas.openxmlformats.org/drawingml/2006/main" xmlns:r="http://schemas.openxmlformats.org/officeDocument/2006/relationships" xmlns:p="http://schemas.openxmlformats.org/presentationml/2006/main" type="title" preserve="1">
   <p:cSld name="Title Slide">
@@ -2426,7 +2558,7 @@
           <a:p>
             <a:fld id="{EB14851A-53D1-B04B-AD6B-CB7FEFB4C1FD}" type="datetimeFigureOut">
               <a:rPr lang="en-US" smtClean="0"/>
-              <a:t>7/26/24</a:t>
+              <a:t>8/4/24</a:t>
             </a:fld>
             <a:endParaRPr lang="en-US"/>
           </a:p>
@@ -2596,7 +2728,7 @@
           <a:p>
             <a:fld id="{EB14851A-53D1-B04B-AD6B-CB7FEFB4C1FD}" type="datetimeFigureOut">
               <a:rPr lang="en-US" smtClean="0"/>
-              <a:t>7/26/24</a:t>
+              <a:t>8/4/24</a:t>
             </a:fld>
             <a:endParaRPr lang="en-US"/>
           </a:p>
@@ -2776,7 +2908,7 @@
           <a:p>
             <a:fld id="{EB14851A-53D1-B04B-AD6B-CB7FEFB4C1FD}" type="datetimeFigureOut">
               <a:rPr lang="en-US" smtClean="0"/>
-              <a:t>7/26/24</a:t>
+              <a:t>8/4/24</a:t>
             </a:fld>
             <a:endParaRPr lang="en-US"/>
           </a:p>
@@ -2946,7 +3078,7 @@
           <a:p>
             <a:fld id="{EB14851A-53D1-B04B-AD6B-CB7FEFB4C1FD}" type="datetimeFigureOut">
               <a:rPr lang="en-US" smtClean="0"/>
-              <a:t>7/26/24</a:t>
+              <a:t>8/4/24</a:t>
             </a:fld>
             <a:endParaRPr lang="en-US"/>
           </a:p>
@@ -3192,7 +3324,7 @@
           <a:p>
             <a:fld id="{EB14851A-53D1-B04B-AD6B-CB7FEFB4C1FD}" type="datetimeFigureOut">
               <a:rPr lang="en-US" smtClean="0"/>
-              <a:t>7/26/24</a:t>
+              <a:t>8/4/24</a:t>
             </a:fld>
             <a:endParaRPr lang="en-US"/>
           </a:p>
@@ -3424,7 +3556,7 @@
           <a:p>
             <a:fld id="{EB14851A-53D1-B04B-AD6B-CB7FEFB4C1FD}" type="datetimeFigureOut">
               <a:rPr lang="en-US" smtClean="0"/>
-              <a:t>7/26/24</a:t>
+              <a:t>8/4/24</a:t>
             </a:fld>
             <a:endParaRPr lang="en-US"/>
           </a:p>
@@ -3791,7 +3923,7 @@
           <a:p>
             <a:fld id="{EB14851A-53D1-B04B-AD6B-CB7FEFB4C1FD}" type="datetimeFigureOut">
               <a:rPr lang="en-US" smtClean="0"/>
-              <a:t>7/26/24</a:t>
+              <a:t>8/4/24</a:t>
             </a:fld>
             <a:endParaRPr lang="en-US"/>
           </a:p>
@@ -3909,7 +4041,7 @@
           <a:p>
             <a:fld id="{EB14851A-53D1-B04B-AD6B-CB7FEFB4C1FD}" type="datetimeFigureOut">
               <a:rPr lang="en-US" smtClean="0"/>
-              <a:t>7/26/24</a:t>
+              <a:t>8/4/24</a:t>
             </a:fld>
             <a:endParaRPr lang="en-US"/>
           </a:p>
@@ -4004,7 +4136,7 @@
           <a:p>
             <a:fld id="{EB14851A-53D1-B04B-AD6B-CB7FEFB4C1FD}" type="datetimeFigureOut">
               <a:rPr lang="en-US" smtClean="0"/>
-              <a:t>7/26/24</a:t>
+              <a:t>8/4/24</a:t>
             </a:fld>
             <a:endParaRPr lang="en-US"/>
           </a:p>
@@ -4281,7 +4413,7 @@
           <a:p>
             <a:fld id="{EB14851A-53D1-B04B-AD6B-CB7FEFB4C1FD}" type="datetimeFigureOut">
               <a:rPr lang="en-US" smtClean="0"/>
-              <a:t>7/26/24</a:t>
+              <a:t>8/4/24</a:t>
             </a:fld>
             <a:endParaRPr lang="en-US"/>
           </a:p>
@@ -4538,7 +4670,7 @@
           <a:p>
             <a:fld id="{EB14851A-53D1-B04B-AD6B-CB7FEFB4C1FD}" type="datetimeFigureOut">
               <a:rPr lang="en-US" smtClean="0"/>
-              <a:t>7/26/24</a:t>
+              <a:t>8/4/24</a:t>
             </a:fld>
             <a:endParaRPr lang="en-US"/>
           </a:p>
@@ -4751,7 +4883,7 @@
           <a:p>
             <a:fld id="{EB14851A-53D1-B04B-AD6B-CB7FEFB4C1FD}" type="datetimeFigureOut">
               <a:rPr lang="en-US" smtClean="0"/>
-              <a:t>7/26/24</a:t>
+              <a:t>8/4/24</a:t>
             </a:fld>
             <a:endParaRPr lang="en-US"/>
           </a:p>
@@ -5941,7 +6073,7 @@
         </p:nvSpPr>
         <p:spPr>
           <a:xfrm>
-            <a:off x="4997706" y="5162553"/>
+            <a:off x="4470934" y="5101281"/>
             <a:ext cx="1478692" cy="877330"/>
           </a:xfrm>
           <a:prstGeom prst="roundRect">
@@ -6000,7 +6132,7 @@
         </p:nvSpPr>
         <p:spPr>
           <a:xfrm>
-            <a:off x="4715554" y="3554582"/>
+            <a:off x="4188782" y="3493310"/>
             <a:ext cx="1760840" cy="877330"/>
           </a:xfrm>
           <a:prstGeom prst="roundRect">
@@ -6059,7 +6191,7 @@
         </p:nvSpPr>
         <p:spPr>
           <a:xfrm>
-            <a:off x="6777081" y="3554582"/>
+            <a:off x="6250309" y="3493310"/>
             <a:ext cx="1734062" cy="877330"/>
           </a:xfrm>
           <a:prstGeom prst="roundRect">
@@ -6118,7 +6250,7 @@
         </p:nvSpPr>
         <p:spPr>
           <a:xfrm>
-            <a:off x="4742333" y="4967902"/>
+            <a:off x="4215561" y="4906630"/>
             <a:ext cx="3768811" cy="1266632"/>
           </a:xfrm>
           <a:prstGeom prst="roundRect">
@@ -6170,7 +6302,7 @@
         </p:nvSpPr>
         <p:spPr>
           <a:xfrm>
-            <a:off x="6777081" y="5162553"/>
+            <a:off x="6250309" y="5101281"/>
             <a:ext cx="1478692" cy="877330"/>
           </a:xfrm>
           <a:prstGeom prst="roundRect">
@@ -6233,7 +6365,7 @@
         </p:nvCxnSpPr>
         <p:spPr>
           <a:xfrm flipH="1" flipV="1">
-            <a:off x="5595974" y="4431912"/>
+            <a:off x="5069202" y="4370640"/>
             <a:ext cx="1030765" cy="535990"/>
           </a:xfrm>
           <a:prstGeom prst="straightConnector1">
@@ -6279,7 +6411,7 @@
         </p:nvCxnSpPr>
         <p:spPr>
           <a:xfrm flipV="1">
-            <a:off x="6626739" y="4431912"/>
+            <a:off x="6099967" y="4370640"/>
             <a:ext cx="1017373" cy="535990"/>
           </a:xfrm>
           <a:prstGeom prst="straightConnector1">
@@ -6321,7 +6453,7 @@
         </p:nvSpPr>
         <p:spPr>
           <a:xfrm>
-            <a:off x="4997706" y="1946611"/>
+            <a:off x="4470934" y="1885339"/>
             <a:ext cx="1478692" cy="877330"/>
           </a:xfrm>
           <a:prstGeom prst="roundRect">
@@ -6393,7 +6525,7 @@
         </p:nvSpPr>
         <p:spPr>
           <a:xfrm>
-            <a:off x="6777081" y="1946611"/>
+            <a:off x="6250309" y="1885339"/>
             <a:ext cx="1478692" cy="877330"/>
           </a:xfrm>
           <a:prstGeom prst="roundRect">
@@ -6468,8 +6600,8 @@
         </p:nvSpPr>
         <p:spPr>
           <a:xfrm>
-            <a:off x="4742332" y="1751960"/>
-            <a:ext cx="3768811" cy="1266632"/>
+            <a:off x="4215560" y="1690688"/>
+            <a:ext cx="5502875" cy="1266632"/>
           </a:xfrm>
           <a:prstGeom prst="roundRect">
             <a:avLst/>
@@ -6523,13 +6655,13 @@
           <p:nvPr/>
         </p:nvCxnSpPr>
         <p:spPr>
-          <a:xfrm flipH="1" flipV="1">
-            <a:off x="8511143" y="2385276"/>
-            <a:ext cx="1" cy="3215942"/>
+          <a:xfrm flipV="1">
+            <a:off x="7984372" y="2324004"/>
+            <a:ext cx="1734063" cy="3215942"/>
           </a:xfrm>
           <a:prstGeom prst="bentConnector3">
             <a:avLst>
-              <a:gd name="adj1" fmla="val -22860000000"/>
+              <a:gd name="adj1" fmla="val 113183"/>
             </a:avLst>
           </a:prstGeom>
           <a:ln w="38100">
@@ -6572,8 +6704,8 @@
         </p:nvCxnSpPr>
         <p:spPr>
           <a:xfrm flipV="1">
-            <a:off x="5595974" y="3018592"/>
-            <a:ext cx="1030764" cy="535990"/>
+            <a:off x="5069202" y="2957320"/>
+            <a:ext cx="1897796" cy="535990"/>
           </a:xfrm>
           <a:prstGeom prst="straightConnector1">
             <a:avLst/>
@@ -6620,8 +6752,8 @@
         </p:nvCxnSpPr>
         <p:spPr>
           <a:xfrm flipH="1" flipV="1">
-            <a:off x="6626738" y="3018592"/>
-            <a:ext cx="1017374" cy="535990"/>
+            <a:off x="6966998" y="2957320"/>
+            <a:ext cx="150342" cy="535990"/>
           </a:xfrm>
           <a:prstGeom prst="straightConnector1">
             <a:avLst/>
@@ -6664,7 +6796,7 @@
         </p:nvSpPr>
         <p:spPr>
           <a:xfrm>
-            <a:off x="2989731" y="3554582"/>
+            <a:off x="2462959" y="3493310"/>
             <a:ext cx="1478692" cy="877330"/>
           </a:xfrm>
           <a:prstGeom prst="roundRect">
@@ -6727,7 +6859,7 @@
         </p:nvCxnSpPr>
         <p:spPr>
           <a:xfrm flipH="1" flipV="1">
-            <a:off x="3729077" y="4431912"/>
+            <a:off x="3202305" y="4370640"/>
             <a:ext cx="1013256" cy="1169306"/>
           </a:xfrm>
           <a:prstGeom prst="straightConnector1">
@@ -6773,7 +6905,7 @@
         </p:nvCxnSpPr>
         <p:spPr>
           <a:xfrm flipH="1">
-            <a:off x="3729077" y="2385276"/>
+            <a:off x="3202305" y="2324004"/>
             <a:ext cx="1013255" cy="1169306"/>
           </a:xfrm>
           <a:prstGeom prst="straightConnector1">
@@ -6801,6 +6933,81 @@
           </a:fontRef>
         </p:style>
       </p:cxnSp>
+      <p:sp>
+        <p:nvSpPr>
+          <p:cNvPr id="18" name="Rounded Rectangle 17">
+            <a:extLst>
+              <a:ext uri="{FF2B5EF4-FFF2-40B4-BE49-F238E27FC236}">
+                <a16:creationId xmlns:a16="http://schemas.microsoft.com/office/drawing/2014/main" id="{633A54D1-42DC-6B31-8CAC-F8596E46BA4F}"/>
+              </a:ext>
+            </a:extLst>
+          </p:cNvPr>
+          <p:cNvSpPr/>
+          <p:nvPr/>
+        </p:nvSpPr>
+        <p:spPr>
+          <a:xfrm>
+            <a:off x="7984371" y="1885339"/>
+            <a:ext cx="1478692" cy="877330"/>
+          </a:xfrm>
+          <a:prstGeom prst="roundRect">
+            <a:avLst/>
+          </a:prstGeom>
+          <a:solidFill>
+            <a:schemeClr val="accent1"/>
+          </a:solidFill>
+          <a:ln w="12700">
+            <a:noFill/>
+          </a:ln>
+        </p:spPr>
+        <p:style>
+          <a:lnRef idx="2">
+            <a:schemeClr val="accent1">
+              <a:shade val="15000"/>
+            </a:schemeClr>
+          </a:lnRef>
+          <a:fillRef idx="1">
+            <a:schemeClr val="accent1"/>
+          </a:fillRef>
+          <a:effectRef idx="0">
+            <a:schemeClr val="accent1"/>
+          </a:effectRef>
+          <a:fontRef idx="minor">
+            <a:schemeClr val="lt1"/>
+          </a:fontRef>
+        </p:style>
+        <p:txBody>
+          <a:bodyPr rtlCol="0" anchor="ctr"/>
+          <a:lstStyle/>
+          <a:p>
+            <a:pPr algn="ctr"/>
+            <a:r>
+              <a:rPr lang="en-US" sz="1600" b="1" dirty="0">
+                <a:solidFill>
+                  <a:schemeClr val="accent3"/>
+                </a:solidFill>
+              </a:rPr>
+              <a:t>LEADS </a:t>
+            </a:r>
+            <a:r>
+              <a:rPr lang="en-US" sz="1600" b="1" dirty="0" err="1">
+                <a:solidFill>
+                  <a:schemeClr val="accent3"/>
+                </a:solidFill>
+              </a:rPr>
+              <a:t>VeC</a:t>
+            </a:r>
+            <a:r>
+              <a:rPr lang="en-US" sz="1600" b="1" dirty="0">
+                <a:solidFill>
+                  <a:schemeClr val="accent3"/>
+                </a:solidFill>
+              </a:rPr>
+              <a:t> DP</a:t>
+            </a:r>
+          </a:p>
+        </p:txBody>
+      </p:sp>
     </p:spTree>
     <p:extLst>
       <p:ext uri="{BB962C8B-B14F-4D97-AF65-F5344CB8AC3E}">
@@ -6929,7 +7136,7 @@
                                     </p:set>
                                     <p:animEffect transition="in" filter="wipe(down)">
                                       <p:cBhvr>
-                                        <p:cTn id="13" dur="500"/>
+                                        <p:cTn id="13" dur="200"/>
                                         <p:tgtEl>
                                           <p:spTgt spid="20"/>
                                         </p:tgtEl>
@@ -6944,7 +7151,7 @@
                         <p:par>
                           <p:cTn id="14" fill="hold">
                             <p:stCondLst>
-                              <p:cond delay="500"/>
+                              <p:cond delay="200"/>
                             </p:stCondLst>
                             <p:childTnLst>
                               <p:par>
@@ -6973,7 +7180,7 @@
                                     </p:set>
                                     <p:animEffect transition="in" filter="wipe(down)">
                                       <p:cBhvr>
-                                        <p:cTn id="17" dur="500"/>
+                                        <p:cTn id="17" dur="200"/>
                                         <p:tgtEl>
                                           <p:spTgt spid="27"/>
                                         </p:tgtEl>
@@ -7008,7 +7215,7 @@
                                     </p:set>
                                     <p:animEffect transition="in" filter="wipe(down)">
                                       <p:cBhvr>
-                                        <p:cTn id="20" dur="500"/>
+                                        <p:cTn id="20" dur="200"/>
                                         <p:tgtEl>
                                           <p:spTgt spid="23"/>
                                         </p:tgtEl>
@@ -7023,7 +7230,7 @@
                         <p:par>
                           <p:cTn id="21" fill="hold">
                             <p:stCondLst>
-                              <p:cond delay="1000"/>
+                              <p:cond delay="400"/>
                             </p:stCondLst>
                             <p:childTnLst>
                               <p:par>
@@ -7052,7 +7259,7 @@
                                     </p:set>
                                     <p:animEffect transition="in" filter="wipe(down)">
                                       <p:cBhvr>
-                                        <p:cTn id="24" dur="500"/>
+                                        <p:cTn id="24" dur="200"/>
                                         <p:tgtEl>
                                           <p:spTgt spid="17"/>
                                         </p:tgtEl>
@@ -7087,7 +7294,7 @@
                                     </p:set>
                                     <p:animEffect transition="in" filter="wipe(down)">
                                       <p:cBhvr>
-                                        <p:cTn id="27" dur="500"/>
+                                        <p:cTn id="27" dur="200"/>
                                         <p:tgtEl>
                                           <p:spTgt spid="14"/>
                                         </p:tgtEl>
@@ -7140,7 +7347,7 @@
                                     </p:set>
                                     <p:animEffect transition="in" filter="wipe(down)">
                                       <p:cBhvr>
-                                        <p:cTn id="32" dur="500"/>
+                                        <p:cTn id="32" dur="200"/>
                                         <p:tgtEl>
                                           <p:spTgt spid="37"/>
                                         </p:tgtEl>
@@ -7155,7 +7362,7 @@
                         <p:par>
                           <p:cTn id="33" fill="hold">
                             <p:stCondLst>
-                              <p:cond delay="500"/>
+                              <p:cond delay="200"/>
                             </p:stCondLst>
                             <p:childTnLst>
                               <p:par>
@@ -7184,7 +7391,7 @@
                                     </p:set>
                                     <p:animEffect transition="in" filter="wipe(right)">
                                       <p:cBhvr>
-                                        <p:cTn id="36" dur="500"/>
+                                        <p:cTn id="36" dur="200"/>
                                         <p:tgtEl>
                                           <p:spTgt spid="35"/>
                                         </p:tgtEl>
@@ -7207,6 +7414,50 @@
                                           </p:stCondLst>
                                         </p:cTn>
                                         <p:tgtEl>
+                                          <p:spTgt spid="18"/>
+                                        </p:tgtEl>
+                                        <p:attrNameLst>
+                                          <p:attrName>style.visibility</p:attrName>
+                                        </p:attrNameLst>
+                                      </p:cBhvr>
+                                      <p:to>
+                                        <p:strVal val="visible"/>
+                                      </p:to>
+                                    </p:set>
+                                    <p:animEffect transition="in" filter="wipe(right)">
+                                      <p:cBhvr>
+                                        <p:cTn id="39" dur="200"/>
+                                        <p:tgtEl>
+                                          <p:spTgt spid="18"/>
+                                        </p:tgtEl>
+                                      </p:cBhvr>
+                                    </p:animEffect>
+                                  </p:childTnLst>
+                                </p:cTn>
+                              </p:par>
+                            </p:childTnLst>
+                          </p:cTn>
+                        </p:par>
+                        <p:par>
+                          <p:cTn id="40" fill="hold">
+                            <p:stCondLst>
+                              <p:cond delay="400"/>
+                            </p:stCondLst>
+                            <p:childTnLst>
+                              <p:par>
+                                <p:cTn id="41" presetID="22" presetClass="entr" presetSubtype="2" fill="hold" grpId="0" nodeType="afterEffect">
+                                  <p:stCondLst>
+                                    <p:cond delay="0"/>
+                                  </p:stCondLst>
+                                  <p:childTnLst>
+                                    <p:set>
+                                      <p:cBhvr>
+                                        <p:cTn id="42" dur="1" fill="hold">
+                                          <p:stCondLst>
+                                            <p:cond delay="0"/>
+                                          </p:stCondLst>
+                                        </p:cTn>
+                                        <p:tgtEl>
                                           <p:spTgt spid="34"/>
                                         </p:tgtEl>
                                         <p:attrNameLst>
@@ -7219,7 +7470,7 @@
                                     </p:set>
                                     <p:animEffect transition="in" filter="wipe(right)">
                                       <p:cBhvr>
-                                        <p:cTn id="39" dur="500"/>
+                                        <p:cTn id="43" dur="200"/>
                                         <p:tgtEl>
                                           <p:spTgt spid="34"/>
                                         </p:tgtEl>
@@ -7232,20 +7483,20 @@
                           </p:cTn>
                         </p:par>
                         <p:par>
-                          <p:cTn id="40" fill="hold">
+                          <p:cTn id="44" fill="hold">
                             <p:stCondLst>
-                              <p:cond delay="1000"/>
+                              <p:cond delay="600"/>
                             </p:stCondLst>
                             <p:childTnLst>
                               <p:par>
-                                <p:cTn id="41" presetID="22" presetClass="entr" presetSubtype="2" fill="hold" grpId="0" nodeType="afterEffect">
+                                <p:cTn id="45" presetID="22" presetClass="entr" presetSubtype="2" fill="hold" grpId="0" nodeType="afterEffect">
                                   <p:stCondLst>
                                     <p:cond delay="0"/>
                                   </p:stCondLst>
                                   <p:childTnLst>
                                     <p:set>
                                       <p:cBhvr>
-                                        <p:cTn id="42" dur="1" fill="hold">
+                                        <p:cTn id="46" dur="1" fill="hold">
                                           <p:stCondLst>
                                             <p:cond delay="0"/>
                                           </p:stCondLst>
@@ -7263,7 +7514,7 @@
                                     </p:set>
                                     <p:animEffect transition="in" filter="wipe(right)">
                                       <p:cBhvr>
-                                        <p:cTn id="43" dur="500"/>
+                                        <p:cTn id="47" dur="200"/>
                                         <p:tgtEl>
                                           <p:spTgt spid="33"/>
                                         </p:tgtEl>
@@ -7279,26 +7530,26 @@
                     </p:cTn>
                   </p:par>
                   <p:par>
-                    <p:cTn id="44" fill="hold">
+                    <p:cTn id="48" fill="hold">
                       <p:stCondLst>
                         <p:cond delay="indefinite"/>
                       </p:stCondLst>
                       <p:childTnLst>
                         <p:par>
-                          <p:cTn id="45" fill="hold">
+                          <p:cTn id="49" fill="hold">
                             <p:stCondLst>
                               <p:cond delay="0"/>
                             </p:stCondLst>
                             <p:childTnLst>
                               <p:par>
-                                <p:cTn id="46" presetID="22" presetClass="entr" presetSubtype="4" fill="hold" nodeType="clickEffect">
+                                <p:cTn id="50" presetID="22" presetClass="entr" presetSubtype="4" fill="hold" nodeType="clickEffect">
                                   <p:stCondLst>
                                     <p:cond delay="0"/>
                                   </p:stCondLst>
                                   <p:childTnLst>
                                     <p:set>
                                       <p:cBhvr>
-                                        <p:cTn id="47" dur="1" fill="hold">
+                                        <p:cTn id="51" dur="1" fill="hold">
                                           <p:stCondLst>
                                             <p:cond delay="0"/>
                                           </p:stCondLst>
@@ -7316,7 +7567,7 @@
                                     </p:set>
                                     <p:animEffect transition="in" filter="wipe(down)">
                                       <p:cBhvr>
-                                        <p:cTn id="48" dur="500"/>
+                                        <p:cTn id="52" dur="200"/>
                                         <p:tgtEl>
                                           <p:spTgt spid="48"/>
                                         </p:tgtEl>
@@ -7326,14 +7577,14 @@
                                 </p:cTn>
                               </p:par>
                               <p:par>
-                                <p:cTn id="49" presetID="22" presetClass="entr" presetSubtype="4" fill="hold" nodeType="withEffect">
+                                <p:cTn id="53" presetID="22" presetClass="entr" presetSubtype="4" fill="hold" nodeType="withEffect">
                                   <p:stCondLst>
                                     <p:cond delay="0"/>
                                   </p:stCondLst>
                                   <p:childTnLst>
                                     <p:set>
                                       <p:cBhvr>
-                                        <p:cTn id="50" dur="1" fill="hold">
+                                        <p:cTn id="54" dur="1" fill="hold">
                                           <p:stCondLst>
                                             <p:cond delay="0"/>
                                           </p:stCondLst>
@@ -7351,7 +7602,7 @@
                                     </p:set>
                                     <p:animEffect transition="in" filter="wipe(down)">
                                       <p:cBhvr>
-                                        <p:cTn id="51" dur="500"/>
+                                        <p:cTn id="55" dur="200"/>
                                         <p:tgtEl>
                                           <p:spTgt spid="51"/>
                                         </p:tgtEl>
@@ -7367,26 +7618,26 @@
                     </p:cTn>
                   </p:par>
                   <p:par>
-                    <p:cTn id="52" fill="hold">
+                    <p:cTn id="56" fill="hold">
                       <p:stCondLst>
                         <p:cond delay="indefinite"/>
                       </p:stCondLst>
                       <p:childTnLst>
                         <p:par>
-                          <p:cTn id="53" fill="hold">
+                          <p:cTn id="57" fill="hold">
                             <p:stCondLst>
                               <p:cond delay="0"/>
                             </p:stCondLst>
                             <p:childTnLst>
                               <p:par>
-                                <p:cTn id="54" presetID="22" presetClass="entr" presetSubtype="1" fill="hold" nodeType="clickEffect">
+                                <p:cTn id="58" presetID="22" presetClass="entr" presetSubtype="1" fill="hold" nodeType="clickEffect">
                                   <p:stCondLst>
                                     <p:cond delay="0"/>
                                   </p:stCondLst>
                                   <p:childTnLst>
                                     <p:set>
                                       <p:cBhvr>
-                                        <p:cTn id="55" dur="1" fill="hold">
+                                        <p:cTn id="59" dur="1" fill="hold">
                                           <p:stCondLst>
                                             <p:cond delay="0"/>
                                           </p:stCondLst>
@@ -7404,7 +7655,7 @@
                                     </p:set>
                                     <p:animEffect transition="in" filter="wipe(up)">
                                       <p:cBhvr>
-                                        <p:cTn id="56" dur="500"/>
+                                        <p:cTn id="60" dur="200"/>
                                         <p:tgtEl>
                                           <p:spTgt spid="63"/>
                                         </p:tgtEl>
@@ -7414,14 +7665,14 @@
                                 </p:cTn>
                               </p:par>
                               <p:par>
-                                <p:cTn id="57" presetID="22" presetClass="entr" presetSubtype="4" fill="hold" nodeType="withEffect">
+                                <p:cTn id="61" presetID="22" presetClass="entr" presetSubtype="4" fill="hold" nodeType="withEffect">
                                   <p:stCondLst>
                                     <p:cond delay="0"/>
                                   </p:stCondLst>
                                   <p:childTnLst>
                                     <p:set>
                                       <p:cBhvr>
-                                        <p:cTn id="58" dur="1" fill="hold">
+                                        <p:cTn id="62" dur="1" fill="hold">
                                           <p:stCondLst>
                                             <p:cond delay="0"/>
                                           </p:stCondLst>
@@ -7439,7 +7690,7 @@
                                     </p:set>
                                     <p:animEffect transition="in" filter="wipe(down)">
                                       <p:cBhvr>
-                                        <p:cTn id="59" dur="500"/>
+                                        <p:cTn id="63" dur="200"/>
                                         <p:tgtEl>
                                           <p:spTgt spid="58"/>
                                         </p:tgtEl>
@@ -7452,20 +7703,20 @@
                           </p:cTn>
                         </p:par>
                         <p:par>
-                          <p:cTn id="60" fill="hold">
+                          <p:cTn id="64" fill="hold">
                             <p:stCondLst>
-                              <p:cond delay="500"/>
+                              <p:cond delay="200"/>
                             </p:stCondLst>
                             <p:childTnLst>
                               <p:par>
-                                <p:cTn id="61" presetID="10" presetClass="entr" presetSubtype="0" fill="hold" grpId="0" nodeType="afterEffect">
+                                <p:cTn id="65" presetID="10" presetClass="entr" presetSubtype="0" fill="hold" grpId="0" nodeType="afterEffect">
                                   <p:stCondLst>
                                     <p:cond delay="0"/>
                                   </p:stCondLst>
                                   <p:childTnLst>
                                     <p:set>
                                       <p:cBhvr>
-                                        <p:cTn id="62" dur="1" fill="hold">
+                                        <p:cTn id="66" dur="1" fill="hold">
                                           <p:stCondLst>
                                             <p:cond delay="0"/>
                                           </p:stCondLst>
@@ -7483,7 +7734,7 @@
                                     </p:set>
                                     <p:animEffect transition="in" filter="fade">
                                       <p:cBhvr>
-                                        <p:cTn id="63" dur="500"/>
+                                        <p:cTn id="67" dur="200"/>
                                         <p:tgtEl>
                                           <p:spTgt spid="57"/>
                                         </p:tgtEl>
@@ -7529,6 +7780,7 @@
       <p:bldP spid="34" grpId="0" animBg="1"/>
       <p:bldP spid="35" grpId="0" animBg="1"/>
       <p:bldP spid="57" grpId="0" animBg="1"/>
+      <p:bldP spid="18" grpId="0" animBg="1"/>
     </p:bldLst>
   </p:timing>
 </p:sld>

</xml_diff>